<commit_message>
v0.8 - Detailed 2nd draft. Some minor polishing (i.e. shortening of sentences) required before submission.
</commit_message>
<xml_diff>
--- a/Personal.pptx
+++ b/Personal.pptx
@@ -2,7 +2,7 @@
 <file path=ppt/presentation.xml><?xml version="1.0" encoding="utf-8"?>
 <p:presentation xmlns:a="http://schemas.openxmlformats.org/drawingml/2006/main" xmlns:r="http://schemas.openxmlformats.org/officeDocument/2006/relationships" xmlns:p="http://schemas.openxmlformats.org/presentationml/2006/main" saveSubsetFonts="1">
   <p:sldMasterIdLst>
-    <p:sldMasterId id="2147483708" r:id="rId1"/>
+    <p:sldMasterId id="2147483720" r:id="rId1"/>
   </p:sldMasterIdLst>
   <p:sldIdLst>
     <p:sldId id="256" r:id="rId2"/>
@@ -14,6 +14,7 @@
     <p:sldId id="262" r:id="rId8"/>
     <p:sldId id="263" r:id="rId9"/>
     <p:sldId id="264" r:id="rId10"/>
+    <p:sldId id="265" r:id="rId11"/>
   </p:sldIdLst>
   <p:sldSz cx="9144000" cy="6858000" type="screen4x3"/>
   <p:notesSz cx="6858000" cy="9144000"/>
@@ -3539,17 +3540,17 @@
   </p:cSld>
   <p:clrMap bg1="lt1" tx1="dk1" bg2="lt2" tx2="dk2" accent1="accent1" accent2="accent2" accent3="accent3" accent4="accent4" accent5="accent5" accent6="accent6" hlink="hlink" folHlink="folHlink"/>
   <p:sldLayoutIdLst>
-    <p:sldLayoutId id="2147483709" r:id="rId1"/>
-    <p:sldLayoutId id="2147483710" r:id="rId2"/>
-    <p:sldLayoutId id="2147483711" r:id="rId3"/>
-    <p:sldLayoutId id="2147483712" r:id="rId4"/>
-    <p:sldLayoutId id="2147483713" r:id="rId5"/>
-    <p:sldLayoutId id="2147483714" r:id="rId6"/>
-    <p:sldLayoutId id="2147483715" r:id="rId7"/>
-    <p:sldLayoutId id="2147483716" r:id="rId8"/>
-    <p:sldLayoutId id="2147483717" r:id="rId9"/>
-    <p:sldLayoutId id="2147483718" r:id="rId10"/>
-    <p:sldLayoutId id="2147483719" r:id="rId11"/>
+    <p:sldLayoutId id="2147483721" r:id="rId1"/>
+    <p:sldLayoutId id="2147483722" r:id="rId2"/>
+    <p:sldLayoutId id="2147483723" r:id="rId3"/>
+    <p:sldLayoutId id="2147483724" r:id="rId4"/>
+    <p:sldLayoutId id="2147483725" r:id="rId5"/>
+    <p:sldLayoutId id="2147483726" r:id="rId6"/>
+    <p:sldLayoutId id="2147483727" r:id="rId7"/>
+    <p:sldLayoutId id="2147483728" r:id="rId8"/>
+    <p:sldLayoutId id="2147483729" r:id="rId9"/>
+    <p:sldLayoutId id="2147483730" r:id="rId10"/>
+    <p:sldLayoutId id="2147483731" r:id="rId11"/>
   </p:sldLayoutIdLst>
   <p:txStyles>
     <p:titleStyle>
@@ -3950,7 +3951,6 @@
               <a:rPr lang="en-IE" dirty="0"/>
               <a:t>KTQ0855</a:t>
             </a:r>
-            <a:endParaRPr lang="en-IE" dirty="0"/>
           </a:p>
         </p:txBody>
       </p:sp>
@@ -3958,6 +3958,158 @@
     <p:extLst>
       <p:ext uri="{BB962C8B-B14F-4D97-AF65-F5344CB8AC3E}">
         <p14:creationId xmlns:p14="http://schemas.microsoft.com/office/powerpoint/2010/main" val="3842745804"/>
+      </p:ext>
+    </p:extLst>
+  </p:cSld>
+  <p:clrMapOvr>
+    <a:masterClrMapping/>
+  </p:clrMapOvr>
+</p:sld>
+</file>
+
+<file path=ppt/slides/slide10.xml><?xml version="1.0" encoding="utf-8"?>
+<p:sld xmlns:a="http://schemas.openxmlformats.org/drawingml/2006/main" xmlns:r="http://schemas.openxmlformats.org/officeDocument/2006/relationships" xmlns:p="http://schemas.openxmlformats.org/presentationml/2006/main">
+  <p:cSld>
+    <p:spTree>
+      <p:nvGrpSpPr>
+        <p:cNvPr id="1" name=""/>
+        <p:cNvGrpSpPr/>
+        <p:nvPr/>
+      </p:nvGrpSpPr>
+      <p:grpSpPr>
+        <a:xfrm>
+          <a:off x="0" y="0"/>
+          <a:ext cx="0" cy="0"/>
+          <a:chOff x="0" y="0"/>
+          <a:chExt cx="0" cy="0"/>
+        </a:xfrm>
+      </p:grpSpPr>
+      <p:sp>
+        <p:nvSpPr>
+          <p:cNvPr id="2" name="Title 1"/>
+          <p:cNvSpPr>
+            <a:spLocks noGrp="1"/>
+          </p:cNvSpPr>
+          <p:nvPr>
+            <p:ph type="title"/>
+          </p:nvPr>
+        </p:nvSpPr>
+        <p:spPr/>
+        <p:txBody>
+          <a:bodyPr/>
+          <a:lstStyle/>
+          <a:p>
+            <a:r>
+              <a:rPr lang="en-IE" dirty="0" smtClean="0"/>
+              <a:t>Bibliography</a:t>
+            </a:r>
+            <a:endParaRPr lang="en-IE" dirty="0"/>
+          </a:p>
+        </p:txBody>
+      </p:sp>
+      <p:sp>
+        <p:nvSpPr>
+          <p:cNvPr id="3" name="Content Placeholder 2"/>
+          <p:cNvSpPr>
+            <a:spLocks noGrp="1"/>
+          </p:cNvSpPr>
+          <p:nvPr>
+            <p:ph idx="1"/>
+          </p:nvPr>
+        </p:nvSpPr>
+        <p:spPr/>
+        <p:txBody>
+          <a:bodyPr/>
+          <a:lstStyle/>
+          <a:p>
+            <a:r>
+              <a:rPr lang="en-IE" b="1" dirty="0"/>
+              <a:t>How to learn? From </a:t>
+            </a:r>
+            <a:r>
+              <a:rPr lang="en-IE" b="1" dirty="0" smtClean="0"/>
+              <a:t>mistakes</a:t>
+            </a:r>
+            <a:r>
+              <a:rPr lang="en-IE" dirty="0" smtClean="0"/>
+              <a:t/>
+            </a:r>
+            <a:br>
+              <a:rPr lang="en-IE" dirty="0" smtClean="0"/>
+            </a:br>
+            <a:r>
+              <a:rPr lang="en-IE" dirty="0" smtClean="0">
+                <a:hlinkClick r:id="rId2"/>
+              </a:rPr>
+              <a:t>https</a:t>
+            </a:r>
+            <a:r>
+              <a:rPr lang="en-IE" dirty="0">
+                <a:hlinkClick r:id="rId2"/>
+              </a:rPr>
+              <a:t>://</a:t>
+            </a:r>
+            <a:r>
+              <a:rPr lang="en-IE" dirty="0" smtClean="0">
+                <a:hlinkClick r:id="rId2"/>
+              </a:rPr>
+              <a:t>www.ted.com/talks/diana_laufenberg_3_ways_to_teach?language=en</a:t>
+            </a:r>
+            <a:endParaRPr lang="en-IE" dirty="0" smtClean="0"/>
+          </a:p>
+          <a:p>
+            <a:r>
+              <a:rPr lang="en-IE" dirty="0" smtClean="0"/>
+              <a:t>The first 20 hours – how to </a:t>
+            </a:r>
+            <a:r>
+              <a:rPr lang="en-IE" dirty="0"/>
+              <a:t>learn anything</a:t>
+            </a:r>
+            <a:br>
+              <a:rPr lang="en-IE" dirty="0"/>
+            </a:br>
+            <a:r>
+              <a:rPr lang="en-IE" dirty="0">
+                <a:hlinkClick r:id="rId3"/>
+              </a:rPr>
+              <a:t>https://</a:t>
+            </a:r>
+            <a:r>
+              <a:rPr lang="en-IE" dirty="0" smtClean="0">
+                <a:hlinkClick r:id="rId3"/>
+              </a:rPr>
+              <a:t>www.youtube.com/watch?v=5MgBikgcWnY</a:t>
+            </a:r>
+            <a:endParaRPr lang="en-IE" dirty="0"/>
+          </a:p>
+          <a:p>
+            <a:r>
+              <a:rPr lang="en-IE" dirty="0" smtClean="0"/>
+              <a:t>How to teach (yourself)</a:t>
+            </a:r>
+            <a:br>
+              <a:rPr lang="en-IE" dirty="0" smtClean="0"/>
+            </a:br>
+            <a:r>
+              <a:rPr lang="en-IE" dirty="0" smtClean="0"/>
+              <a:t>http</a:t>
+            </a:r>
+            <a:r>
+              <a:rPr lang="en-IE" dirty="0"/>
+              <a:t>://www.wikihow.com/Teach</a:t>
+            </a:r>
+            <a:endParaRPr lang="en-IE" dirty="0" smtClean="0"/>
+          </a:p>
+          <a:p>
+            <a:endParaRPr lang="en-IE" dirty="0"/>
+          </a:p>
+        </p:txBody>
+      </p:sp>
+    </p:spTree>
+    <p:extLst>
+      <p:ext uri="{BB962C8B-B14F-4D97-AF65-F5344CB8AC3E}">
+        <p14:creationId xmlns:p14="http://schemas.microsoft.com/office/powerpoint/2010/main" val="124703865"/>
       </p:ext>
     </p:extLst>
   </p:cSld>
@@ -4027,8 +4179,8 @@
           <a:lstStyle/>
           <a:p>
             <a:pPr marL="514350" indent="-514350">
-              <a:buFont typeface="+mj-lt"/>
-              <a:buAutoNum type="arabicPeriod"/>
+              <a:buFont typeface="Arial" pitchFamily="34" charset="0"/>
+              <a:buChar char="•"/>
             </a:pPr>
             <a:r>
               <a:rPr lang="en-IE" dirty="0" smtClean="0"/>
@@ -4037,8 +4189,8 @@
           </a:p>
           <a:p>
             <a:pPr marL="514350" indent="-514350">
-              <a:buFont typeface="+mj-lt"/>
-              <a:buAutoNum type="arabicPeriod"/>
+              <a:buFont typeface="Arial" pitchFamily="34" charset="0"/>
+              <a:buChar char="•"/>
             </a:pPr>
             <a:r>
               <a:rPr lang="en-IE" dirty="0"/>
@@ -4051,8 +4203,8 @@
           </a:p>
           <a:p>
             <a:pPr marL="514350" indent="-514350">
-              <a:buFont typeface="+mj-lt"/>
-              <a:buAutoNum type="arabicPeriod"/>
+              <a:buFont typeface="Arial" pitchFamily="34" charset="0"/>
+              <a:buChar char="•"/>
             </a:pPr>
             <a:r>
               <a:rPr lang="en-IE" dirty="0"/>
@@ -4065,8 +4217,8 @@
           </a:p>
           <a:p>
             <a:pPr marL="514350" indent="-514350">
-              <a:buFont typeface="+mj-lt"/>
-              <a:buAutoNum type="arabicPeriod"/>
+              <a:buFont typeface="Arial" pitchFamily="34" charset="0"/>
+              <a:buChar char="•"/>
             </a:pPr>
             <a:r>
               <a:rPr lang="en-IE" dirty="0"/>
@@ -4079,8 +4231,8 @@
           </a:p>
           <a:p>
             <a:pPr marL="514350" indent="-514350">
-              <a:buFont typeface="+mj-lt"/>
-              <a:buAutoNum type="arabicPeriod"/>
+              <a:buFont typeface="Arial" pitchFamily="34" charset="0"/>
+              <a:buChar char="•"/>
             </a:pPr>
             <a:r>
               <a:rPr lang="en-IE" dirty="0"/>
@@ -4093,8 +4245,8 @@
           </a:p>
           <a:p>
             <a:pPr marL="514350" indent="-514350">
-              <a:buFont typeface="+mj-lt"/>
-              <a:buAutoNum type="arabicPeriod"/>
+              <a:buFont typeface="Arial" pitchFamily="34" charset="0"/>
+              <a:buChar char="•"/>
             </a:pPr>
             <a:r>
               <a:rPr lang="en-IE" dirty="0"/>
@@ -4151,12 +4303,8 @@
           <a:lstStyle/>
           <a:p>
             <a:r>
-              <a:rPr lang="en-IE" smtClean="0"/>
-              <a:t>Benefits of </a:t>
-            </a:r>
-            <a:r>
               <a:rPr lang="en-IE" dirty="0" smtClean="0"/>
-              <a:t>Professional Development</a:t>
+              <a:t>Benefits of Professional Development</a:t>
             </a:r>
             <a:endParaRPr lang="en-IE" dirty="0"/>
           </a:p>
@@ -4174,10 +4322,76 @@
         </p:nvSpPr>
         <p:spPr/>
         <p:txBody>
-          <a:bodyPr/>
-          <a:lstStyle/>
-          <a:p>
-            <a:endParaRPr lang="en-IE"/>
+          <a:bodyPr>
+            <a:normAutofit fontScale="85000" lnSpcReduction="20000"/>
+          </a:bodyPr>
+          <a:lstStyle/>
+          <a:p>
+            <a:pPr marL="457200" indent="-457200">
+              <a:buFont typeface="Arial" pitchFamily="34" charset="0"/>
+              <a:buChar char="•"/>
+            </a:pPr>
+            <a:r>
+              <a:rPr lang="en-IE" dirty="0"/>
+              <a:t>Sharpen your </a:t>
+            </a:r>
+            <a:r>
+              <a:rPr lang="en-IE" dirty="0" smtClean="0"/>
+              <a:t>knowledge</a:t>
+            </a:r>
+          </a:p>
+          <a:p>
+            <a:pPr marL="457200" indent="-457200">
+              <a:buFont typeface="Arial" pitchFamily="34" charset="0"/>
+              <a:buChar char="•"/>
+            </a:pPr>
+            <a:r>
+              <a:rPr lang="en-IE" dirty="0"/>
+              <a:t>Develop your </a:t>
+            </a:r>
+            <a:r>
+              <a:rPr lang="en-IE" dirty="0" smtClean="0"/>
+              <a:t>skills</a:t>
+            </a:r>
+          </a:p>
+          <a:p>
+            <a:pPr marL="457200" indent="-457200">
+              <a:buFont typeface="Arial" pitchFamily="34" charset="0"/>
+              <a:buChar char="•"/>
+            </a:pPr>
+            <a:r>
+              <a:rPr lang="en-IE" dirty="0"/>
+              <a:t>Keep </a:t>
+            </a:r>
+            <a:r>
+              <a:rPr lang="en-IE" dirty="0" smtClean="0"/>
+              <a:t>up-to-date</a:t>
+            </a:r>
+          </a:p>
+          <a:p>
+            <a:pPr marL="457200" indent="-457200">
+              <a:buFont typeface="Arial" pitchFamily="34" charset="0"/>
+              <a:buChar char="•"/>
+            </a:pPr>
+            <a:r>
+              <a:rPr lang="en-IE" dirty="0" smtClean="0"/>
+              <a:t>Start </a:t>
+            </a:r>
+            <a:r>
+              <a:rPr lang="en-IE" dirty="0"/>
+              <a:t>networking</a:t>
+            </a:r>
+          </a:p>
+          <a:p>
+            <a:pPr marL="457200" indent="-457200">
+              <a:buFont typeface="Arial" pitchFamily="34" charset="0"/>
+              <a:buChar char="•"/>
+            </a:pPr>
+            <a:r>
+              <a:rPr lang="en-IE" dirty="0"/>
+              <a:t>Reenergize your ideas</a:t>
+            </a:r>
+            <a:endParaRPr lang="en-IE" dirty="0"/>
           </a:p>
         </p:txBody>
       </p:sp>
@@ -4229,10 +4443,16 @@
           <a:lstStyle/>
           <a:p>
             <a:r>
+              <a:rPr lang="en-IE" b="0" dirty="0">
+                <a:effectLst/>
+              </a:rPr>
+              <a:t>D</a:t>
+            </a:r>
+            <a:r>
               <a:rPr lang="en-IE" b="0" dirty="0" smtClean="0">
                 <a:effectLst/>
               </a:rPr>
-              <a:t>development</a:t>
+              <a:t>evelopment</a:t>
             </a:r>
             <a:r>
               <a:rPr lang="en-IE" b="0" dirty="0">
@@ -4255,13 +4475,19 @@
               <a:rPr lang="en-IE" b="0" dirty="0" smtClean="0">
                 <a:effectLst/>
               </a:rPr>
-              <a:t>opportunities </a:t>
+              <a:t>Opportunities </a:t>
             </a:r>
             <a:r>
               <a:rPr lang="en-IE" b="0" dirty="0">
                 <a:effectLst/>
               </a:rPr>
-              <a:t>for personal development</a:t>
+              <a:t>for </a:t>
+            </a:r>
+            <a:r>
+              <a:rPr lang="en-IE" b="0" dirty="0" smtClean="0">
+                <a:effectLst/>
+              </a:rPr>
+              <a:t>Personal Development</a:t>
             </a:r>
             <a:endParaRPr lang="en-IE" dirty="0"/>
           </a:p>
@@ -4277,12 +4503,156 @@
             <p:ph type="subTitle" idx="1"/>
           </p:nvPr>
         </p:nvSpPr>
-        <p:spPr/>
-        <p:txBody>
-          <a:bodyPr/>
-          <a:lstStyle/>
-          <a:p>
-            <a:endParaRPr lang="en-IE"/>
+        <p:spPr>
+          <a:xfrm>
+            <a:off x="539552" y="4293096"/>
+            <a:ext cx="7854696" cy="992552"/>
+          </a:xfrm>
+        </p:spPr>
+        <p:txBody>
+          <a:bodyPr numCol="2" anchor="ctr">
+            <a:noAutofit/>
+          </a:bodyPr>
+          <a:lstStyle/>
+          <a:p>
+            <a:pPr marL="514350" indent="-514350" algn="ctr">
+              <a:buFont typeface="+mj-lt"/>
+              <a:buAutoNum type="arabicPeriod"/>
+            </a:pPr>
+            <a:r>
+              <a:rPr lang="en-IE" sz="2000" dirty="0" smtClean="0"/>
+              <a:t>Being </a:t>
+            </a:r>
+            <a:r>
+              <a:rPr lang="en-IE" sz="2000" dirty="0"/>
+              <a:t>coached or </a:t>
+            </a:r>
+            <a:r>
+              <a:rPr lang="en-IE" sz="2000" dirty="0" smtClean="0"/>
+              <a:t>mentored</a:t>
+            </a:r>
+          </a:p>
+          <a:p>
+            <a:pPr marL="514350" indent="-514350" algn="ctr">
+              <a:buFont typeface="+mj-lt"/>
+              <a:buAutoNum type="arabicPeriod"/>
+            </a:pPr>
+            <a:r>
+              <a:rPr lang="en-IE" sz="2000" dirty="0" smtClean="0"/>
+              <a:t>Advice </a:t>
+            </a:r>
+            <a:r>
+              <a:rPr lang="en-IE" sz="2000" dirty="0"/>
+              <a:t>from </a:t>
+            </a:r>
+            <a:r>
+              <a:rPr lang="en-IE" sz="2000" dirty="0" smtClean="0"/>
+              <a:t>colleagues</a:t>
+            </a:r>
+          </a:p>
+          <a:p>
+            <a:pPr marL="514350" indent="-514350" algn="ctr">
+              <a:buFont typeface="+mj-lt"/>
+              <a:buAutoNum type="arabicPeriod"/>
+            </a:pPr>
+            <a:r>
+              <a:rPr lang="en-IE" sz="2000" dirty="0" smtClean="0"/>
+              <a:t>e-learning</a:t>
+            </a:r>
+          </a:p>
+          <a:p>
+            <a:pPr marL="514350" indent="-514350" algn="ctr">
+              <a:buFont typeface="+mj-lt"/>
+              <a:buAutoNum type="arabicPeriod"/>
+            </a:pPr>
+            <a:r>
+              <a:rPr lang="en-IE" sz="2000" dirty="0"/>
+              <a:t>work </a:t>
+            </a:r>
+            <a:r>
+              <a:rPr lang="en-IE" sz="2000" dirty="0" smtClean="0"/>
+              <a:t>shadowing</a:t>
+            </a:r>
+          </a:p>
+          <a:p>
+            <a:pPr marL="514350" indent="-514350" algn="ctr">
+              <a:buFont typeface="+mj-lt"/>
+              <a:buAutoNum type="arabicPeriod"/>
+            </a:pPr>
+            <a:r>
+              <a:rPr lang="en-IE" sz="2000" dirty="0"/>
+              <a:t>internal knowledge sharing </a:t>
+            </a:r>
+            <a:r>
+              <a:rPr lang="en-IE" sz="2000" dirty="0" smtClean="0"/>
+              <a:t>events</a:t>
+            </a:r>
+          </a:p>
+          <a:p>
+            <a:pPr marL="514350" indent="-514350" algn="ctr">
+              <a:buFont typeface="+mj-lt"/>
+              <a:buAutoNum type="arabicPeriod"/>
+            </a:pPr>
+            <a:r>
+              <a:rPr lang="en-IE" sz="2000" dirty="0"/>
+              <a:t>job </a:t>
+            </a:r>
+            <a:r>
+              <a:rPr lang="en-IE" sz="2000" dirty="0" smtClean="0"/>
+              <a:t>rotation</a:t>
+            </a:r>
+          </a:p>
+          <a:p>
+            <a:pPr marL="514350" indent="-514350" algn="ctr">
+              <a:buFont typeface="+mj-lt"/>
+              <a:buAutoNum type="arabicPeriod"/>
+            </a:pPr>
+            <a:r>
+              <a:rPr lang="en-IE" sz="2000" dirty="0"/>
+              <a:t>new assignments and work </a:t>
+            </a:r>
+            <a:r>
+              <a:rPr lang="en-IE" sz="2000" dirty="0" smtClean="0"/>
+              <a:t>experience</a:t>
+            </a:r>
+          </a:p>
+          <a:p>
+            <a:pPr marL="514350" indent="-514350" algn="ctr">
+              <a:buFont typeface="+mj-lt"/>
+              <a:buAutoNum type="arabicPeriod"/>
+            </a:pPr>
+            <a:r>
+              <a:rPr lang="en-IE" sz="2000" dirty="0"/>
+              <a:t>reading books, articles, and watching </a:t>
+            </a:r>
+            <a:r>
+              <a:rPr lang="en-IE" sz="2000" dirty="0" smtClean="0"/>
+              <a:t>DVDs</a:t>
+            </a:r>
+          </a:p>
+          <a:p>
+            <a:pPr marL="514350" indent="-514350" algn="ctr">
+              <a:buFont typeface="+mj-lt"/>
+              <a:buAutoNum type="arabicPeriod"/>
+            </a:pPr>
+            <a:r>
+              <a:rPr lang="en-IE" sz="2000" dirty="0"/>
+              <a:t>starting a peer learning or action learning group</a:t>
+            </a:r>
+            <a:r>
+              <a:rPr lang="en-IE" sz="2000" dirty="0" smtClean="0"/>
+              <a:t>.</a:t>
+            </a:r>
+          </a:p>
+          <a:p>
+            <a:pPr marL="514350" indent="-514350" algn="ctr">
+              <a:buFont typeface="+mj-lt"/>
+              <a:buAutoNum type="arabicPeriod"/>
+            </a:pPr>
+            <a:r>
+              <a:rPr lang="en-IE" sz="2000" dirty="0" smtClean="0"/>
+              <a:t>Volunteering</a:t>
+            </a:r>
           </a:p>
         </p:txBody>
       </p:sp>
@@ -4331,11 +4701,18 @@
           <a:bodyPr/>
           <a:lstStyle/>
           <a:p>
+            <a:pPr algn="ctr"/>
             <a:r>
               <a:rPr lang="en-IE" b="0" dirty="0">
                 <a:effectLst/>
               </a:rPr>
-              <a:t> justifications for your choices</a:t>
+              <a:t> </a:t>
+            </a:r>
+            <a:r>
+              <a:rPr lang="en-IE" b="0" dirty="0" smtClean="0">
+                <a:effectLst/>
+              </a:rPr>
+              <a:t>Why these 10 opportunities</a:t>
             </a:r>
             <a:endParaRPr lang="en-IE" dirty="0"/>
           </a:p>
@@ -4353,10 +4730,116 @@
         </p:nvSpPr>
         <p:spPr/>
         <p:txBody>
-          <a:bodyPr/>
-          <a:lstStyle/>
-          <a:p>
-            <a:endParaRPr lang="en-IE"/>
+          <a:bodyPr numCol="2">
+            <a:noAutofit/>
+          </a:bodyPr>
+          <a:lstStyle/>
+          <a:p>
+            <a:pPr marL="514350" indent="-514350" algn="ctr">
+              <a:buFont typeface="+mj-lt"/>
+              <a:buAutoNum type="arabicPeriod"/>
+            </a:pPr>
+            <a:r>
+              <a:rPr lang="en-IE" sz="2000" dirty="0"/>
+              <a:t>Being coached or mentored</a:t>
+            </a:r>
+          </a:p>
+          <a:p>
+            <a:pPr marL="514350" indent="-514350" algn="ctr">
+              <a:buFont typeface="+mj-lt"/>
+              <a:buAutoNum type="arabicPeriod"/>
+            </a:pPr>
+            <a:r>
+              <a:rPr lang="en-IE" sz="2000" dirty="0"/>
+              <a:t>Advice from colleagues</a:t>
+            </a:r>
+          </a:p>
+          <a:p>
+            <a:pPr marL="514350" indent="-514350" algn="ctr">
+              <a:buFont typeface="+mj-lt"/>
+              <a:buAutoNum type="arabicPeriod"/>
+            </a:pPr>
+            <a:r>
+              <a:rPr lang="en-IE" sz="2000" dirty="0"/>
+              <a:t>e-learning</a:t>
+            </a:r>
+          </a:p>
+          <a:p>
+            <a:pPr marL="514350" indent="-514350" algn="ctr">
+              <a:buFont typeface="+mj-lt"/>
+              <a:buAutoNum type="arabicPeriod"/>
+            </a:pPr>
+            <a:r>
+              <a:rPr lang="en-IE" sz="2000" dirty="0"/>
+              <a:t>work shadowing</a:t>
+            </a:r>
+          </a:p>
+          <a:p>
+            <a:pPr marL="514350" indent="-514350" algn="ctr">
+              <a:buFont typeface="+mj-lt"/>
+              <a:buAutoNum type="arabicPeriod"/>
+            </a:pPr>
+            <a:r>
+              <a:rPr lang="en-IE" sz="2000" dirty="0"/>
+              <a:t>internal knowledge sharing events</a:t>
+            </a:r>
+          </a:p>
+          <a:p>
+            <a:pPr marL="514350" indent="-514350" algn="ctr">
+              <a:buFont typeface="+mj-lt"/>
+              <a:buAutoNum type="arabicPeriod"/>
+            </a:pPr>
+            <a:r>
+              <a:rPr lang="en-IE" sz="2000" dirty="0"/>
+              <a:t>job rotation</a:t>
+            </a:r>
+          </a:p>
+          <a:p>
+            <a:pPr marL="514350" indent="-514350" algn="ctr">
+              <a:buFont typeface="+mj-lt"/>
+              <a:buAutoNum type="arabicPeriod"/>
+            </a:pPr>
+            <a:r>
+              <a:rPr lang="en-IE" sz="2000" dirty="0"/>
+              <a:t>new assignments and work experience</a:t>
+            </a:r>
+          </a:p>
+          <a:p>
+            <a:pPr marL="514350" indent="-514350" algn="ctr">
+              <a:buFont typeface="+mj-lt"/>
+              <a:buAutoNum type="arabicPeriod"/>
+            </a:pPr>
+            <a:r>
+              <a:rPr lang="en-IE" sz="2000" dirty="0"/>
+              <a:t>reading books, articles, and watching DVDs</a:t>
+            </a:r>
+          </a:p>
+          <a:p>
+            <a:pPr marL="514350" indent="-514350" algn="ctr">
+              <a:buFont typeface="+mj-lt"/>
+              <a:buAutoNum type="arabicPeriod"/>
+            </a:pPr>
+            <a:r>
+              <a:rPr lang="en-IE" sz="2000" dirty="0"/>
+              <a:t>starting a peer learning or action learning group.</a:t>
+            </a:r>
+          </a:p>
+          <a:p>
+            <a:pPr marL="514350" indent="-514350" algn="ctr">
+              <a:buFont typeface="+mj-lt"/>
+              <a:buAutoNum type="arabicPeriod"/>
+            </a:pPr>
+            <a:r>
+              <a:rPr lang="en-IE" sz="2000" dirty="0"/>
+              <a:t>Volunteering</a:t>
+            </a:r>
+          </a:p>
+          <a:p>
+            <a:pPr marL="514350" indent="-514350" algn="ctr">
+              <a:buFont typeface="+mj-lt"/>
+              <a:buAutoNum type="arabicPeriod"/>
+            </a:pPr>
+            <a:endParaRPr lang="en-IE" sz="2000" dirty="0"/>
           </a:p>
         </p:txBody>
       </p:sp>
@@ -4406,10 +4889,16 @@
           <a:lstStyle/>
           <a:p>
             <a:r>
-              <a:rPr lang="en-IE" b="0" dirty="0">
+              <a:rPr lang="en-IE" b="0" dirty="0" smtClean="0">
                 <a:effectLst/>
               </a:rPr>
-              <a:t>benefits of reflection</a:t>
+              <a:t>How to r</a:t>
+            </a:r>
+            <a:r>
+              <a:rPr lang="en-IE" b="0" dirty="0" smtClean="0">
+                <a:effectLst/>
+              </a:rPr>
+              <a:t>eflect</a:t>
             </a:r>
             <a:endParaRPr lang="en-IE" dirty="0"/>
           </a:p>
@@ -4427,10 +4916,64 @@
         </p:nvSpPr>
         <p:spPr/>
         <p:txBody>
-          <a:bodyPr/>
-          <a:lstStyle/>
-          <a:p>
-            <a:endParaRPr lang="en-IE"/>
+          <a:bodyPr>
+            <a:normAutofit fontScale="85000" lnSpcReduction="20000"/>
+          </a:bodyPr>
+          <a:lstStyle/>
+          <a:p>
+            <a:pPr marL="514350" indent="-514350">
+              <a:buFont typeface="+mj-lt"/>
+              <a:buAutoNum type="arabicPeriod"/>
+            </a:pPr>
+            <a:r>
+              <a:rPr lang="en-IE" dirty="0"/>
+              <a:t>Establish </a:t>
+            </a:r>
+            <a:r>
+              <a:rPr lang="en-IE" dirty="0" smtClean="0"/>
+              <a:t>successes and failures</a:t>
+            </a:r>
+          </a:p>
+          <a:p>
+            <a:pPr marL="514350" indent="-514350">
+              <a:buFont typeface="+mj-lt"/>
+              <a:buAutoNum type="arabicPeriod"/>
+            </a:pPr>
+            <a:r>
+              <a:rPr lang="en-IE" dirty="0" smtClean="0"/>
+              <a:t>Understand the reasons</a:t>
+            </a:r>
+          </a:p>
+          <a:p>
+            <a:pPr marL="514350" indent="-514350">
+              <a:buFont typeface="+mj-lt"/>
+              <a:buAutoNum type="arabicPeriod"/>
+            </a:pPr>
+            <a:r>
+              <a:rPr lang="en-IE" dirty="0" smtClean="0"/>
+              <a:t>Opportunities for improvement next time</a:t>
+            </a:r>
+          </a:p>
+          <a:p>
+            <a:pPr marL="514350" indent="-514350">
+              <a:buFont typeface="+mj-lt"/>
+              <a:buAutoNum type="arabicPeriod"/>
+            </a:pPr>
+            <a:r>
+              <a:rPr lang="en-IE" dirty="0" smtClean="0"/>
+              <a:t>Identify lessons</a:t>
+            </a:r>
+          </a:p>
+          <a:p>
+            <a:pPr marL="514350" indent="-514350">
+              <a:buFont typeface="+mj-lt"/>
+              <a:buAutoNum type="arabicPeriod"/>
+            </a:pPr>
+            <a:r>
+              <a:rPr lang="en-IE" dirty="0" smtClean="0"/>
+              <a:t>Determine needed changes</a:t>
+            </a:r>
+            <a:endParaRPr lang="en-IE" dirty="0"/>
           </a:p>
         </p:txBody>
       </p:sp>
@@ -4479,6 +5022,10 @@
           <a:bodyPr/>
           <a:lstStyle/>
           <a:p>
+            <a:r>
+              <a:rPr lang="en-IE" dirty="0" smtClean="0"/>
+              <a:t>Benefits of Reflection</a:t>
+            </a:r>
             <a:endParaRPr lang="en-IE" dirty="0"/>
           </a:p>
         </p:txBody>
@@ -4495,10 +5042,54 @@
         </p:nvSpPr>
         <p:spPr/>
         <p:txBody>
-          <a:bodyPr/>
-          <a:lstStyle/>
-          <a:p>
-            <a:endParaRPr lang="en-IE"/>
+          <a:bodyPr>
+            <a:normAutofit fontScale="92500" lnSpcReduction="10000"/>
+          </a:bodyPr>
+          <a:lstStyle/>
+          <a:p>
+            <a:pPr marL="457200" indent="-457200">
+              <a:buFont typeface="Arial" pitchFamily="34" charset="0"/>
+              <a:buChar char="•"/>
+            </a:pPr>
+            <a:r>
+              <a:rPr lang="en-IE" dirty="0"/>
+              <a:t>Emotional </a:t>
+            </a:r>
+            <a:r>
+              <a:rPr lang="en-IE" dirty="0" smtClean="0"/>
+              <a:t>Intelligence</a:t>
+            </a:r>
+          </a:p>
+          <a:p>
+            <a:pPr marL="457200" indent="-457200">
+              <a:buFont typeface="Arial" pitchFamily="34" charset="0"/>
+              <a:buChar char="•"/>
+            </a:pPr>
+            <a:r>
+              <a:rPr lang="en-IE" dirty="0" smtClean="0"/>
+              <a:t>Integrity</a:t>
+            </a:r>
+          </a:p>
+          <a:p>
+            <a:pPr marL="457200" indent="-457200">
+              <a:buFont typeface="Arial" pitchFamily="34" charset="0"/>
+              <a:buChar char="•"/>
+            </a:pPr>
+            <a:r>
+              <a:rPr lang="en-IE" dirty="0" smtClean="0"/>
+              <a:t>Confidence</a:t>
+            </a:r>
+          </a:p>
+          <a:p>
+            <a:pPr marL="457200" indent="-457200">
+              <a:buFont typeface="Arial" pitchFamily="34" charset="0"/>
+              <a:buChar char="•"/>
+            </a:pPr>
+            <a:r>
+              <a:rPr lang="en-IE" dirty="0" smtClean="0"/>
+              <a:t>Identify Mistakes</a:t>
+            </a:r>
+            <a:endParaRPr lang="en-IE" dirty="0"/>
           </a:p>
         </p:txBody>
       </p:sp>
@@ -4551,7 +5142,25 @@
               <a:rPr lang="en-IE" b="0" dirty="0">
                 <a:effectLst/>
               </a:rPr>
-              <a:t>analysis on how people learn</a:t>
+              <a:t>A</a:t>
+            </a:r>
+            <a:r>
+              <a:rPr lang="en-IE" b="0" dirty="0" smtClean="0">
+                <a:effectLst/>
+              </a:rPr>
+              <a:t>nalysis </a:t>
+            </a:r>
+            <a:r>
+              <a:rPr lang="en-IE" b="0" dirty="0">
+                <a:effectLst/>
+              </a:rPr>
+              <a:t>on </a:t>
+            </a:r>
+            <a:r>
+              <a:rPr lang="en-IE" b="0" dirty="0" smtClean="0">
+                <a:effectLst/>
+              </a:rPr>
+              <a:t>How People Learn</a:t>
             </a:r>
             <a:endParaRPr lang="en-IE" dirty="0"/>
           </a:p>
@@ -4569,10 +5178,90 @@
         </p:nvSpPr>
         <p:spPr/>
         <p:txBody>
-          <a:bodyPr/>
-          <a:lstStyle/>
-          <a:p>
-            <a:endParaRPr lang="en-IE"/>
+          <a:bodyPr>
+            <a:normAutofit fontScale="40000" lnSpcReduction="20000"/>
+          </a:bodyPr>
+          <a:lstStyle/>
+          <a:p>
+            <a:pPr marL="514350" indent="-514350">
+              <a:buFont typeface="Arial" pitchFamily="34" charset="0"/>
+              <a:buChar char="•"/>
+            </a:pPr>
+            <a:r>
+              <a:rPr lang="en-IE" dirty="0"/>
+              <a:t>Students learn new ideas by relating them to what they already know, and then transferring them into their long-term memory</a:t>
+            </a:r>
+            <a:r>
+              <a:rPr lang="en-IE" dirty="0" smtClean="0"/>
+              <a:t>.</a:t>
+            </a:r>
+          </a:p>
+          <a:p>
+            <a:pPr marL="514350" indent="-514350">
+              <a:buFont typeface="Arial" pitchFamily="34" charset="0"/>
+              <a:buChar char="•"/>
+            </a:pPr>
+            <a:r>
+              <a:rPr lang="en-IE" dirty="0"/>
+              <a:t>Students remember information better when they are given many opportunities to practice retrieving it from their long-term memories and think about its meaning</a:t>
+            </a:r>
+            <a:r>
+              <a:rPr lang="en-IE" dirty="0" smtClean="0"/>
+              <a:t>.</a:t>
+            </a:r>
+          </a:p>
+          <a:p>
+            <a:pPr marL="514350" indent="-514350">
+              <a:buFont typeface="Arial" pitchFamily="34" charset="0"/>
+              <a:buChar char="•"/>
+            </a:pPr>
+            <a:r>
+              <a:rPr lang="en-IE" dirty="0"/>
+              <a:t>Problem-solving and critical-thinking skills are developed through feedback and depend heavily upon background knowledge</a:t>
+            </a:r>
+            <a:r>
+              <a:rPr lang="en-IE" dirty="0" smtClean="0"/>
+              <a:t>.</a:t>
+            </a:r>
+          </a:p>
+          <a:p>
+            <a:pPr marL="514350" indent="-514350">
+              <a:buFont typeface="Arial" pitchFamily="34" charset="0"/>
+              <a:buChar char="•"/>
+            </a:pPr>
+            <a:r>
+              <a:rPr lang="en-IE" dirty="0"/>
+              <a:t>For students to transfer their abilities to new situations, they need to deeply understand both the problem's structure and context</a:t>
+            </a:r>
+            <a:r>
+              <a:rPr lang="en-IE" dirty="0" smtClean="0"/>
+              <a:t>.</a:t>
+            </a:r>
+          </a:p>
+          <a:p>
+            <a:pPr marL="514350" indent="-514350">
+              <a:buFont typeface="Arial" pitchFamily="34" charset="0"/>
+              <a:buChar char="•"/>
+            </a:pPr>
+            <a:r>
+              <a:rPr lang="en-IE" dirty="0"/>
+              <a:t>Student motivation depends on a variety of social and psychological factors</a:t>
+            </a:r>
+            <a:r>
+              <a:rPr lang="en-IE" dirty="0" smtClean="0"/>
+              <a:t>.</a:t>
+            </a:r>
+          </a:p>
+          <a:p>
+            <a:pPr marL="514350" indent="-514350">
+              <a:buFont typeface="Arial" pitchFamily="34" charset="0"/>
+              <a:buChar char="•"/>
+            </a:pPr>
+            <a:r>
+              <a:rPr lang="en-IE" dirty="0"/>
+              <a:t> Misconceptions about learning, while prevalent in education, shouldn't determine how curricula are designed or how instruction is provided.</a:t>
+            </a:r>
+            <a:endParaRPr lang="en-IE" dirty="0"/>
           </a:p>
         </p:txBody>
       </p:sp>
@@ -4621,7 +5310,11 @@
           <a:bodyPr/>
           <a:lstStyle/>
           <a:p>
-            <a:endParaRPr lang="en-IE"/>
+            <a:r>
+              <a:rPr lang="en-IE" dirty="0" smtClean="0"/>
+              <a:t>How to learn</a:t>
+            </a:r>
+            <a:endParaRPr lang="en-IE" dirty="0"/>
           </a:p>
         </p:txBody>
       </p:sp>
@@ -4635,12 +5328,131 @@
             <p:ph type="subTitle" idx="1"/>
           </p:nvPr>
         </p:nvSpPr>
-        <p:spPr/>
-        <p:txBody>
-          <a:bodyPr/>
-          <a:lstStyle/>
-          <a:p>
-            <a:endParaRPr lang="en-IE"/>
+        <p:spPr>
+          <a:xfrm>
+            <a:off x="533400" y="3228536"/>
+            <a:ext cx="7854696" cy="2432712"/>
+          </a:xfrm>
+        </p:spPr>
+        <p:txBody>
+          <a:bodyPr numCol="3">
+            <a:normAutofit fontScale="92500" lnSpcReduction="20000"/>
+          </a:bodyPr>
+          <a:lstStyle/>
+          <a:p>
+            <a:pPr marL="514350" indent="-514350">
+              <a:buFont typeface="+mj-lt"/>
+              <a:buAutoNum type="arabicPeriod"/>
+            </a:pPr>
+            <a:r>
+              <a:rPr lang="en-IE" dirty="0"/>
+              <a:t>Identify Needs</a:t>
+            </a:r>
+          </a:p>
+          <a:p>
+            <a:pPr marL="514350" indent="-514350">
+              <a:buFont typeface="+mj-lt"/>
+              <a:buAutoNum type="arabicPeriod"/>
+            </a:pPr>
+            <a:r>
+              <a:rPr lang="en-IE" dirty="0"/>
+              <a:t>Set Goals</a:t>
+            </a:r>
+          </a:p>
+          <a:p>
+            <a:pPr marL="514350" indent="-514350">
+              <a:buFont typeface="+mj-lt"/>
+              <a:buAutoNum type="arabicPeriod"/>
+            </a:pPr>
+            <a:r>
+              <a:rPr lang="en-IE" dirty="0"/>
+              <a:t>Develop Lesson Plans</a:t>
+            </a:r>
+          </a:p>
+          <a:p>
+            <a:pPr marL="514350" indent="-514350">
+              <a:buFont typeface="+mj-lt"/>
+              <a:buAutoNum type="arabicPeriod"/>
+            </a:pPr>
+            <a:r>
+              <a:rPr lang="en-IE" dirty="0" smtClean="0"/>
+              <a:t>Allow </a:t>
+            </a:r>
+            <a:r>
+              <a:rPr lang="en-IE" dirty="0"/>
+              <a:t>Independent Exploration</a:t>
+            </a:r>
+          </a:p>
+          <a:p>
+            <a:pPr marL="514350" indent="-514350">
+              <a:buFont typeface="+mj-lt"/>
+              <a:buAutoNum type="arabicPeriod"/>
+            </a:pPr>
+            <a:r>
+              <a:rPr lang="en-IE" dirty="0"/>
+              <a:t>Reinforce Learning</a:t>
+            </a:r>
+          </a:p>
+          <a:p>
+            <a:pPr marL="514350" indent="-514350">
+              <a:buFont typeface="+mj-lt"/>
+              <a:buAutoNum type="arabicPeriod"/>
+            </a:pPr>
+            <a:r>
+              <a:rPr lang="en-IE" dirty="0"/>
+              <a:t>Assess Progress</a:t>
+            </a:r>
+          </a:p>
+          <a:p>
+            <a:pPr marL="514350" indent="-514350">
+              <a:buFont typeface="+mj-lt"/>
+              <a:buAutoNum type="arabicPeriod"/>
+            </a:pPr>
+            <a:r>
+              <a:rPr lang="en-IE" dirty="0"/>
+              <a:t>Reward Success</a:t>
+            </a:r>
+          </a:p>
+          <a:p>
+            <a:pPr marL="514350" indent="-514350">
+              <a:buFont typeface="+mj-lt"/>
+              <a:buAutoNum type="arabicPeriod"/>
+            </a:pPr>
+            <a:r>
+              <a:rPr lang="en-IE" dirty="0"/>
+              <a:t>See Mistakes as Opportunities</a:t>
+            </a:r>
+          </a:p>
+          <a:p>
+            <a:pPr marL="514350" indent="-514350">
+              <a:buFont typeface="+mj-lt"/>
+              <a:buAutoNum type="arabicPeriod"/>
+            </a:pPr>
+            <a:r>
+              <a:rPr lang="en-IE" dirty="0"/>
+              <a:t>Meet Emotional Needs</a:t>
+            </a:r>
+          </a:p>
+          <a:p>
+            <a:pPr marL="514350" indent="-514350">
+              <a:buFont typeface="+mj-lt"/>
+              <a:buAutoNum type="arabicPeriod"/>
+            </a:pPr>
+            <a:r>
+              <a:rPr lang="en-IE" dirty="0"/>
+              <a:t>Get Feedback</a:t>
+            </a:r>
+          </a:p>
+          <a:p>
+            <a:pPr marL="514350" indent="-514350">
+              <a:buFont typeface="+mj-lt"/>
+              <a:buAutoNum type="arabicPeriod"/>
+            </a:pPr>
+            <a:r>
+              <a:rPr lang="en-IE" dirty="0"/>
+              <a:t>Keep Learning</a:t>
+            </a:r>
+            <a:endParaRPr lang="en-IE" dirty="0"/>
           </a:p>
         </p:txBody>
       </p:sp>

</xml_diff>

<commit_message>
v1.0 - Task 1 completed.
</commit_message>
<xml_diff>
--- a/Personal.pptx
+++ b/Personal.pptx
@@ -4,6 +4,9 @@
   <p:sldMasterIdLst>
     <p:sldMasterId id="2147483720" r:id="rId1"/>
   </p:sldMasterIdLst>
+  <p:notesMasterIdLst>
+    <p:notesMasterId r:id="rId13"/>
+  </p:notesMasterIdLst>
   <p:sldIdLst>
     <p:sldId id="256" r:id="rId2"/>
     <p:sldId id="257" r:id="rId3"/>
@@ -15,6 +18,7 @@
     <p:sldId id="263" r:id="rId9"/>
     <p:sldId id="264" r:id="rId10"/>
     <p:sldId id="265" r:id="rId11"/>
+    <p:sldId id="266" r:id="rId12"/>
   </p:sldIdLst>
   <p:sldSz cx="9144000" cy="6858000" type="screen4x3"/>
   <p:notesSz cx="6858000" cy="9144000"/>
@@ -114,6 +118,548 @@
     </a:lvl9pPr>
   </p:defaultTextStyle>
 </p:presentation>
+</file>
+
+<file path=ppt/notesMasters/notesMaster1.xml><?xml version="1.0" encoding="utf-8"?>
+<p:notesMaster xmlns:a="http://schemas.openxmlformats.org/drawingml/2006/main" xmlns:r="http://schemas.openxmlformats.org/officeDocument/2006/relationships" xmlns:p="http://schemas.openxmlformats.org/presentationml/2006/main">
+  <p:cSld>
+    <p:bg>
+      <p:bgRef idx="1001">
+        <a:schemeClr val="bg1"/>
+      </p:bgRef>
+    </p:bg>
+    <p:spTree>
+      <p:nvGrpSpPr>
+        <p:cNvPr id="1" name=""/>
+        <p:cNvGrpSpPr/>
+        <p:nvPr/>
+      </p:nvGrpSpPr>
+      <p:grpSpPr>
+        <a:xfrm>
+          <a:off x="0" y="0"/>
+          <a:ext cx="0" cy="0"/>
+          <a:chOff x="0" y="0"/>
+          <a:chExt cx="0" cy="0"/>
+        </a:xfrm>
+      </p:grpSpPr>
+      <p:sp>
+        <p:nvSpPr>
+          <p:cNvPr id="2" name="Header Placeholder 1"/>
+          <p:cNvSpPr>
+            <a:spLocks noGrp="1"/>
+          </p:cNvSpPr>
+          <p:nvPr>
+            <p:ph type="hdr" sz="quarter"/>
+          </p:nvPr>
+        </p:nvSpPr>
+        <p:spPr>
+          <a:xfrm>
+            <a:off x="0" y="0"/>
+            <a:ext cx="2971800" cy="457200"/>
+          </a:xfrm>
+          <a:prstGeom prst="rect">
+            <a:avLst/>
+          </a:prstGeom>
+        </p:spPr>
+        <p:txBody>
+          <a:bodyPr vert="horz" lIns="91440" tIns="45720" rIns="91440" bIns="45720" rtlCol="0"/>
+          <a:lstStyle>
+            <a:lvl1pPr algn="l">
+              <a:defRPr sz="1200"/>
+            </a:lvl1pPr>
+          </a:lstStyle>
+          <a:p>
+            <a:endParaRPr lang="en-IE"/>
+          </a:p>
+        </p:txBody>
+      </p:sp>
+      <p:sp>
+        <p:nvSpPr>
+          <p:cNvPr id="3" name="Date Placeholder 2"/>
+          <p:cNvSpPr>
+            <a:spLocks noGrp="1"/>
+          </p:cNvSpPr>
+          <p:nvPr>
+            <p:ph type="dt" idx="1"/>
+          </p:nvPr>
+        </p:nvSpPr>
+        <p:spPr>
+          <a:xfrm>
+            <a:off x="3884613" y="0"/>
+            <a:ext cx="2971800" cy="457200"/>
+          </a:xfrm>
+          <a:prstGeom prst="rect">
+            <a:avLst/>
+          </a:prstGeom>
+        </p:spPr>
+        <p:txBody>
+          <a:bodyPr vert="horz" lIns="91440" tIns="45720" rIns="91440" bIns="45720" rtlCol="0"/>
+          <a:lstStyle>
+            <a:lvl1pPr algn="r">
+              <a:defRPr sz="1200"/>
+            </a:lvl1pPr>
+          </a:lstStyle>
+          <a:p>
+            <a:fld id="{98684069-11BB-45F8-9966-9FCC1E0EFD90}" type="datetimeFigureOut">
+              <a:rPr lang="en-IE" smtClean="0"/>
+              <a:t>10/10/2016</a:t>
+            </a:fld>
+            <a:endParaRPr lang="en-IE"/>
+          </a:p>
+        </p:txBody>
+      </p:sp>
+      <p:sp>
+        <p:nvSpPr>
+          <p:cNvPr id="4" name="Slide Image Placeholder 3"/>
+          <p:cNvSpPr>
+            <a:spLocks noGrp="1" noRot="1" noChangeAspect="1"/>
+          </p:cNvSpPr>
+          <p:nvPr>
+            <p:ph type="sldImg" idx="2"/>
+          </p:nvPr>
+        </p:nvSpPr>
+        <p:spPr>
+          <a:xfrm>
+            <a:off x="1143000" y="685800"/>
+            <a:ext cx="4572000" cy="3429000"/>
+          </a:xfrm>
+          <a:prstGeom prst="rect">
+            <a:avLst/>
+          </a:prstGeom>
+          <a:noFill/>
+          <a:ln w="12700">
+            <a:solidFill>
+              <a:prstClr val="black"/>
+            </a:solidFill>
+          </a:ln>
+        </p:spPr>
+        <p:txBody>
+          <a:bodyPr vert="horz" lIns="91440" tIns="45720" rIns="91440" bIns="45720" rtlCol="0" anchor="ctr"/>
+          <a:lstStyle/>
+          <a:p>
+            <a:endParaRPr lang="en-IE"/>
+          </a:p>
+        </p:txBody>
+      </p:sp>
+      <p:sp>
+        <p:nvSpPr>
+          <p:cNvPr id="5" name="Notes Placeholder 4"/>
+          <p:cNvSpPr>
+            <a:spLocks noGrp="1"/>
+          </p:cNvSpPr>
+          <p:nvPr>
+            <p:ph type="body" sz="quarter" idx="3"/>
+          </p:nvPr>
+        </p:nvSpPr>
+        <p:spPr>
+          <a:xfrm>
+            <a:off x="685800" y="4343400"/>
+            <a:ext cx="5486400" cy="4114800"/>
+          </a:xfrm>
+          <a:prstGeom prst="rect">
+            <a:avLst/>
+          </a:prstGeom>
+        </p:spPr>
+        <p:txBody>
+          <a:bodyPr vert="horz" lIns="91440" tIns="45720" rIns="91440" bIns="45720" rtlCol="0"/>
+          <a:lstStyle/>
+          <a:p>
+            <a:pPr lvl="0"/>
+            <a:r>
+              <a:rPr lang="en-US" smtClean="0"/>
+              <a:t>Click to edit Master text styles</a:t>
+            </a:r>
+          </a:p>
+          <a:p>
+            <a:pPr lvl="1"/>
+            <a:r>
+              <a:rPr lang="en-US" smtClean="0"/>
+              <a:t>Second level</a:t>
+            </a:r>
+          </a:p>
+          <a:p>
+            <a:pPr lvl="2"/>
+            <a:r>
+              <a:rPr lang="en-US" smtClean="0"/>
+              <a:t>Third level</a:t>
+            </a:r>
+          </a:p>
+          <a:p>
+            <a:pPr lvl="3"/>
+            <a:r>
+              <a:rPr lang="en-US" smtClean="0"/>
+              <a:t>Fourth level</a:t>
+            </a:r>
+          </a:p>
+          <a:p>
+            <a:pPr lvl="4"/>
+            <a:r>
+              <a:rPr lang="en-US" smtClean="0"/>
+              <a:t>Fifth level</a:t>
+            </a:r>
+            <a:endParaRPr lang="en-IE"/>
+          </a:p>
+        </p:txBody>
+      </p:sp>
+      <p:sp>
+        <p:nvSpPr>
+          <p:cNvPr id="6" name="Footer Placeholder 5"/>
+          <p:cNvSpPr>
+            <a:spLocks noGrp="1"/>
+          </p:cNvSpPr>
+          <p:nvPr>
+            <p:ph type="ftr" sz="quarter" idx="4"/>
+          </p:nvPr>
+        </p:nvSpPr>
+        <p:spPr>
+          <a:xfrm>
+            <a:off x="0" y="8685213"/>
+            <a:ext cx="2971800" cy="457200"/>
+          </a:xfrm>
+          <a:prstGeom prst="rect">
+            <a:avLst/>
+          </a:prstGeom>
+        </p:spPr>
+        <p:txBody>
+          <a:bodyPr vert="horz" lIns="91440" tIns="45720" rIns="91440" bIns="45720" rtlCol="0" anchor="b"/>
+          <a:lstStyle>
+            <a:lvl1pPr algn="l">
+              <a:defRPr sz="1200"/>
+            </a:lvl1pPr>
+          </a:lstStyle>
+          <a:p>
+            <a:endParaRPr lang="en-IE"/>
+          </a:p>
+        </p:txBody>
+      </p:sp>
+      <p:sp>
+        <p:nvSpPr>
+          <p:cNvPr id="7" name="Slide Number Placeholder 6"/>
+          <p:cNvSpPr>
+            <a:spLocks noGrp="1"/>
+          </p:cNvSpPr>
+          <p:nvPr>
+            <p:ph type="sldNum" sz="quarter" idx="5"/>
+          </p:nvPr>
+        </p:nvSpPr>
+        <p:spPr>
+          <a:xfrm>
+            <a:off x="3884613" y="8685213"/>
+            <a:ext cx="2971800" cy="457200"/>
+          </a:xfrm>
+          <a:prstGeom prst="rect">
+            <a:avLst/>
+          </a:prstGeom>
+        </p:spPr>
+        <p:txBody>
+          <a:bodyPr vert="horz" lIns="91440" tIns="45720" rIns="91440" bIns="45720" rtlCol="0" anchor="b"/>
+          <a:lstStyle>
+            <a:lvl1pPr algn="r">
+              <a:defRPr sz="1200"/>
+            </a:lvl1pPr>
+          </a:lstStyle>
+          <a:p>
+            <a:fld id="{F2F178B2-5E38-4BEE-B69E-D776C56B79A0}" type="slidenum">
+              <a:rPr lang="en-IE" smtClean="0"/>
+              <a:t>‹#›</a:t>
+            </a:fld>
+            <a:endParaRPr lang="en-IE"/>
+          </a:p>
+        </p:txBody>
+      </p:sp>
+    </p:spTree>
+    <p:extLst>
+      <p:ext uri="{BB962C8B-B14F-4D97-AF65-F5344CB8AC3E}">
+        <p14:creationId xmlns:p14="http://schemas.microsoft.com/office/powerpoint/2010/main" val="1031716210"/>
+      </p:ext>
+    </p:extLst>
+  </p:cSld>
+  <p:clrMap bg1="lt1" tx1="dk1" bg2="lt2" tx2="dk2" accent1="accent1" accent2="accent2" accent3="accent3" accent4="accent4" accent5="accent5" accent6="accent6" hlink="hlink" folHlink="folHlink"/>
+  <p:notesStyle>
+    <a:lvl1pPr marL="0" algn="l" defTabSz="914400" rtl="0" eaLnBrk="1" latinLnBrk="0" hangingPunct="1">
+      <a:defRPr sz="1200" kern="1200">
+        <a:solidFill>
+          <a:schemeClr val="tx1"/>
+        </a:solidFill>
+        <a:latin typeface="+mn-lt"/>
+        <a:ea typeface="+mn-ea"/>
+        <a:cs typeface="+mn-cs"/>
+      </a:defRPr>
+    </a:lvl1pPr>
+    <a:lvl2pPr marL="457200" algn="l" defTabSz="914400" rtl="0" eaLnBrk="1" latinLnBrk="0" hangingPunct="1">
+      <a:defRPr sz="1200" kern="1200">
+        <a:solidFill>
+          <a:schemeClr val="tx1"/>
+        </a:solidFill>
+        <a:latin typeface="+mn-lt"/>
+        <a:ea typeface="+mn-ea"/>
+        <a:cs typeface="+mn-cs"/>
+      </a:defRPr>
+    </a:lvl2pPr>
+    <a:lvl3pPr marL="914400" algn="l" defTabSz="914400" rtl="0" eaLnBrk="1" latinLnBrk="0" hangingPunct="1">
+      <a:defRPr sz="1200" kern="1200">
+        <a:solidFill>
+          <a:schemeClr val="tx1"/>
+        </a:solidFill>
+        <a:latin typeface="+mn-lt"/>
+        <a:ea typeface="+mn-ea"/>
+        <a:cs typeface="+mn-cs"/>
+      </a:defRPr>
+    </a:lvl3pPr>
+    <a:lvl4pPr marL="1371600" algn="l" defTabSz="914400" rtl="0" eaLnBrk="1" latinLnBrk="0" hangingPunct="1">
+      <a:defRPr sz="1200" kern="1200">
+        <a:solidFill>
+          <a:schemeClr val="tx1"/>
+        </a:solidFill>
+        <a:latin typeface="+mn-lt"/>
+        <a:ea typeface="+mn-ea"/>
+        <a:cs typeface="+mn-cs"/>
+      </a:defRPr>
+    </a:lvl4pPr>
+    <a:lvl5pPr marL="1828800" algn="l" defTabSz="914400" rtl="0" eaLnBrk="1" latinLnBrk="0" hangingPunct="1">
+      <a:defRPr sz="1200" kern="1200">
+        <a:solidFill>
+          <a:schemeClr val="tx1"/>
+        </a:solidFill>
+        <a:latin typeface="+mn-lt"/>
+        <a:ea typeface="+mn-ea"/>
+        <a:cs typeface="+mn-cs"/>
+      </a:defRPr>
+    </a:lvl5pPr>
+    <a:lvl6pPr marL="2286000" algn="l" defTabSz="914400" rtl="0" eaLnBrk="1" latinLnBrk="0" hangingPunct="1">
+      <a:defRPr sz="1200" kern="1200">
+        <a:solidFill>
+          <a:schemeClr val="tx1"/>
+        </a:solidFill>
+        <a:latin typeface="+mn-lt"/>
+        <a:ea typeface="+mn-ea"/>
+        <a:cs typeface="+mn-cs"/>
+      </a:defRPr>
+    </a:lvl6pPr>
+    <a:lvl7pPr marL="2743200" algn="l" defTabSz="914400" rtl="0" eaLnBrk="1" latinLnBrk="0" hangingPunct="1">
+      <a:defRPr sz="1200" kern="1200">
+        <a:solidFill>
+          <a:schemeClr val="tx1"/>
+        </a:solidFill>
+        <a:latin typeface="+mn-lt"/>
+        <a:ea typeface="+mn-ea"/>
+        <a:cs typeface="+mn-cs"/>
+      </a:defRPr>
+    </a:lvl7pPr>
+    <a:lvl8pPr marL="3200400" algn="l" defTabSz="914400" rtl="0" eaLnBrk="1" latinLnBrk="0" hangingPunct="1">
+      <a:defRPr sz="1200" kern="1200">
+        <a:solidFill>
+          <a:schemeClr val="tx1"/>
+        </a:solidFill>
+        <a:latin typeface="+mn-lt"/>
+        <a:ea typeface="+mn-ea"/>
+        <a:cs typeface="+mn-cs"/>
+      </a:defRPr>
+    </a:lvl8pPr>
+    <a:lvl9pPr marL="3657600" algn="l" defTabSz="914400" rtl="0" eaLnBrk="1" latinLnBrk="0" hangingPunct="1">
+      <a:defRPr sz="1200" kern="1200">
+        <a:solidFill>
+          <a:schemeClr val="tx1"/>
+        </a:solidFill>
+        <a:latin typeface="+mn-lt"/>
+        <a:ea typeface="+mn-ea"/>
+        <a:cs typeface="+mn-cs"/>
+      </a:defRPr>
+    </a:lvl9pPr>
+  </p:notesStyle>
+</p:notesMaster>
+</file>
+
+<file path=ppt/notesSlides/notesSlide1.xml><?xml version="1.0" encoding="utf-8"?>
+<p:notes xmlns:a="http://schemas.openxmlformats.org/drawingml/2006/main" xmlns:r="http://schemas.openxmlformats.org/officeDocument/2006/relationships" xmlns:p="http://schemas.openxmlformats.org/presentationml/2006/main">
+  <p:cSld>
+    <p:spTree>
+      <p:nvGrpSpPr>
+        <p:cNvPr id="1" name=""/>
+        <p:cNvGrpSpPr/>
+        <p:nvPr/>
+      </p:nvGrpSpPr>
+      <p:grpSpPr>
+        <a:xfrm>
+          <a:off x="0" y="0"/>
+          <a:ext cx="0" cy="0"/>
+          <a:chOff x="0" y="0"/>
+          <a:chExt cx="0" cy="0"/>
+        </a:xfrm>
+      </p:grpSpPr>
+      <p:sp>
+        <p:nvSpPr>
+          <p:cNvPr id="2" name="Slide Image Placeholder 1"/>
+          <p:cNvSpPr>
+            <a:spLocks noGrp="1" noRot="1" noChangeAspect="1"/>
+          </p:cNvSpPr>
+          <p:nvPr>
+            <p:ph type="sldImg"/>
+          </p:nvPr>
+        </p:nvSpPr>
+        <p:spPr/>
+      </p:sp>
+      <p:sp>
+        <p:nvSpPr>
+          <p:cNvPr id="3" name="Notes Placeholder 2"/>
+          <p:cNvSpPr>
+            <a:spLocks noGrp="1"/>
+          </p:cNvSpPr>
+          <p:nvPr>
+            <p:ph type="body" idx="1"/>
+          </p:nvPr>
+        </p:nvSpPr>
+        <p:spPr/>
+        <p:txBody>
+          <a:bodyPr/>
+          <a:lstStyle/>
+          <a:p>
+            <a:endParaRPr lang="en-IE" dirty="0"/>
+          </a:p>
+        </p:txBody>
+      </p:sp>
+      <p:sp>
+        <p:nvSpPr>
+          <p:cNvPr id="4" name="Slide Number Placeholder 3"/>
+          <p:cNvSpPr>
+            <a:spLocks noGrp="1"/>
+          </p:cNvSpPr>
+          <p:nvPr>
+            <p:ph type="sldNum" sz="quarter" idx="10"/>
+          </p:nvPr>
+        </p:nvSpPr>
+        <p:spPr/>
+        <p:txBody>
+          <a:bodyPr/>
+          <a:lstStyle/>
+          <a:p>
+            <a:fld id="{F2F178B2-5E38-4BEE-B69E-D776C56B79A0}" type="slidenum">
+              <a:rPr lang="en-IE" smtClean="0"/>
+              <a:t>6</a:t>
+            </a:fld>
+            <a:endParaRPr lang="en-IE"/>
+          </a:p>
+        </p:txBody>
+      </p:sp>
+    </p:spTree>
+    <p:extLst>
+      <p:ext uri="{BB962C8B-B14F-4D97-AF65-F5344CB8AC3E}">
+        <p14:creationId xmlns:p14="http://schemas.microsoft.com/office/powerpoint/2010/main" val="658560579"/>
+      </p:ext>
+    </p:extLst>
+  </p:cSld>
+  <p:clrMapOvr>
+    <a:masterClrMapping/>
+  </p:clrMapOvr>
+</p:notes>
+</file>
+
+<file path=ppt/notesSlides/notesSlide2.xml><?xml version="1.0" encoding="utf-8"?>
+<p:notes xmlns:a="http://schemas.openxmlformats.org/drawingml/2006/main" xmlns:r="http://schemas.openxmlformats.org/officeDocument/2006/relationships" xmlns:p="http://schemas.openxmlformats.org/presentationml/2006/main">
+  <p:cSld>
+    <p:spTree>
+      <p:nvGrpSpPr>
+        <p:cNvPr id="1" name=""/>
+        <p:cNvGrpSpPr/>
+        <p:nvPr/>
+      </p:nvGrpSpPr>
+      <p:grpSpPr>
+        <a:xfrm>
+          <a:off x="0" y="0"/>
+          <a:ext cx="0" cy="0"/>
+          <a:chOff x="0" y="0"/>
+          <a:chExt cx="0" cy="0"/>
+        </a:xfrm>
+      </p:grpSpPr>
+      <p:sp>
+        <p:nvSpPr>
+          <p:cNvPr id="2" name="Slide Image Placeholder 1"/>
+          <p:cNvSpPr>
+            <a:spLocks noGrp="1" noRot="1" noChangeAspect="1"/>
+          </p:cNvSpPr>
+          <p:nvPr>
+            <p:ph type="sldImg"/>
+          </p:nvPr>
+        </p:nvSpPr>
+        <p:spPr/>
+      </p:sp>
+      <p:sp>
+        <p:nvSpPr>
+          <p:cNvPr id="3" name="Notes Placeholder 2"/>
+          <p:cNvSpPr>
+            <a:spLocks noGrp="1"/>
+          </p:cNvSpPr>
+          <p:nvPr>
+            <p:ph type="body" idx="1"/>
+          </p:nvPr>
+        </p:nvSpPr>
+        <p:spPr/>
+        <p:txBody>
+          <a:bodyPr/>
+          <a:lstStyle/>
+          <a:p>
+            <a:r>
+              <a:rPr lang="en-IE" dirty="0" smtClean="0"/>
+              <a:t>Increase emotional intelligence</a:t>
+            </a:r>
+            <a:br>
+              <a:rPr lang="en-IE" dirty="0" smtClean="0"/>
+            </a:br>
+            <a:r>
+              <a:rPr lang="en-IE" dirty="0" smtClean="0"/>
+              <a:t>Demonstrate and develop integrity</a:t>
+            </a:r>
+          </a:p>
+          <a:p>
+            <a:r>
+              <a:rPr lang="en-IE" dirty="0" smtClean="0"/>
+              <a:t>Build confidence</a:t>
+            </a:r>
+            <a:br>
+              <a:rPr lang="en-IE" dirty="0" smtClean="0"/>
+            </a:br>
+            <a:r>
+              <a:rPr lang="en-IE" dirty="0" smtClean="0"/>
+              <a:t>Identify and overcome mistakes</a:t>
+            </a:r>
+            <a:endParaRPr lang="en-IE" dirty="0"/>
+          </a:p>
+        </p:txBody>
+      </p:sp>
+      <p:sp>
+        <p:nvSpPr>
+          <p:cNvPr id="4" name="Slide Number Placeholder 3"/>
+          <p:cNvSpPr>
+            <a:spLocks noGrp="1"/>
+          </p:cNvSpPr>
+          <p:nvPr>
+            <p:ph type="sldNum" sz="quarter" idx="10"/>
+          </p:nvPr>
+        </p:nvSpPr>
+        <p:spPr/>
+        <p:txBody>
+          <a:bodyPr/>
+          <a:lstStyle/>
+          <a:p>
+            <a:fld id="{F2F178B2-5E38-4BEE-B69E-D776C56B79A0}" type="slidenum">
+              <a:rPr lang="en-IE" smtClean="0"/>
+              <a:t>7</a:t>
+            </a:fld>
+            <a:endParaRPr lang="en-IE"/>
+          </a:p>
+        </p:txBody>
+      </p:sp>
+    </p:spTree>
+    <p:extLst>
+      <p:ext uri="{BB962C8B-B14F-4D97-AF65-F5344CB8AC3E}">
+        <p14:creationId xmlns:p14="http://schemas.microsoft.com/office/powerpoint/2010/main" val="2772729878"/>
+      </p:ext>
+    </p:extLst>
+  </p:cSld>
+  <p:clrMapOvr>
+    <a:masterClrMapping/>
+  </p:clrMapOvr>
+</p:notes>
 </file>
 
 <file path=ppt/slideLayouts/slideLayout1.xml><?xml version="1.0" encoding="utf-8"?>
@@ -4119,6 +4665,148 @@
 </p:sld>
 </file>
 
+<file path=ppt/slides/slide11.xml><?xml version="1.0" encoding="utf-8"?>
+<p:sld xmlns:a="http://schemas.openxmlformats.org/drawingml/2006/main" xmlns:r="http://schemas.openxmlformats.org/officeDocument/2006/relationships" xmlns:p="http://schemas.openxmlformats.org/presentationml/2006/main">
+  <p:cSld>
+    <p:spTree>
+      <p:nvGrpSpPr>
+        <p:cNvPr id="1" name=""/>
+        <p:cNvGrpSpPr/>
+        <p:nvPr/>
+      </p:nvGrpSpPr>
+      <p:grpSpPr>
+        <a:xfrm>
+          <a:off x="0" y="0"/>
+          <a:ext cx="0" cy="0"/>
+          <a:chOff x="0" y="0"/>
+          <a:chExt cx="0" cy="0"/>
+        </a:xfrm>
+      </p:grpSpPr>
+      <p:sp>
+        <p:nvSpPr>
+          <p:cNvPr id="2" name="Title 1"/>
+          <p:cNvSpPr>
+            <a:spLocks noGrp="1"/>
+          </p:cNvSpPr>
+          <p:nvPr>
+            <p:ph type="title"/>
+          </p:nvPr>
+        </p:nvSpPr>
+        <p:spPr/>
+        <p:txBody>
+          <a:bodyPr/>
+          <a:lstStyle/>
+          <a:p>
+            <a:pPr algn="ctr"/>
+            <a:r>
+              <a:rPr lang="en-IE" dirty="0" smtClean="0"/>
+              <a:t>Thank you</a:t>
+            </a:r>
+            <a:endParaRPr lang="en-IE" dirty="0"/>
+          </a:p>
+        </p:txBody>
+      </p:sp>
+      <p:sp>
+        <p:nvSpPr>
+          <p:cNvPr id="3" name="Content Placeholder 2"/>
+          <p:cNvSpPr>
+            <a:spLocks noGrp="1"/>
+          </p:cNvSpPr>
+          <p:nvPr>
+            <p:ph idx="1"/>
+          </p:nvPr>
+        </p:nvSpPr>
+        <p:spPr/>
+        <p:txBody>
+          <a:bodyPr/>
+          <a:lstStyle/>
+          <a:p>
+            <a:pPr marL="0" indent="0" algn="ctr">
+              <a:buNone/>
+            </a:pPr>
+            <a:r>
+              <a:rPr lang="en-IE" b="1" dirty="0" smtClean="0"/>
+              <a:t>Contact info</a:t>
+            </a:r>
+            <a:endParaRPr lang="en-IE" b="1" dirty="0"/>
+          </a:p>
+          <a:p>
+            <a:pPr marL="0" indent="0" algn="ctr">
+              <a:buNone/>
+            </a:pPr>
+            <a:r>
+              <a:rPr lang="en-IE" b="1" dirty="0" smtClean="0"/>
+              <a:t>Email </a:t>
+            </a:r>
+          </a:p>
+          <a:p>
+            <a:pPr marL="0" indent="0" algn="ctr">
+              <a:buNone/>
+            </a:pPr>
+            <a:r>
+              <a:rPr lang="en-IE" b="1" dirty="0" smtClean="0">
+                <a:hlinkClick r:id="rId2"/>
+              </a:rPr>
+              <a:t>ciaranmaher@gmail.com</a:t>
+            </a:r>
+            <a:endParaRPr lang="en-IE" b="1" dirty="0" smtClean="0"/>
+          </a:p>
+          <a:p>
+            <a:pPr marL="0" indent="0" algn="ctr">
+              <a:buNone/>
+            </a:pPr>
+            <a:r>
+              <a:rPr lang="en-IE" b="1" dirty="0" err="1" smtClean="0"/>
+              <a:t>Linkedin</a:t>
+            </a:r>
+            <a:r>
+              <a:rPr lang="en-IE" dirty="0" smtClean="0"/>
+              <a:t/>
+            </a:r>
+            <a:br>
+              <a:rPr lang="en-IE" dirty="0" smtClean="0"/>
+            </a:br>
+            <a:r>
+              <a:rPr lang="en-IE" dirty="0" smtClean="0">
+                <a:hlinkClick r:id="rId3"/>
+              </a:rPr>
+              <a:t>https</a:t>
+            </a:r>
+            <a:r>
+              <a:rPr lang="en-IE" dirty="0">
+                <a:hlinkClick r:id="rId3"/>
+              </a:rPr>
+              <a:t>://</a:t>
+            </a:r>
+            <a:r>
+              <a:rPr lang="en-IE" dirty="0" smtClean="0">
+                <a:hlinkClick r:id="rId3"/>
+              </a:rPr>
+              <a:t>goo.gl/V0R1dp</a:t>
+            </a:r>
+            <a:endParaRPr lang="en-IE" dirty="0" smtClean="0"/>
+          </a:p>
+          <a:p>
+            <a:pPr marL="0" indent="0" algn="ctr">
+              <a:buNone/>
+            </a:pPr>
+            <a:endParaRPr lang="en-IE" dirty="0"/>
+          </a:p>
+        </p:txBody>
+      </p:sp>
+    </p:spTree>
+    <p:extLst>
+      <p:ext uri="{BB962C8B-B14F-4D97-AF65-F5344CB8AC3E}">
+        <p14:creationId xmlns:p14="http://schemas.microsoft.com/office/powerpoint/2010/main" val="4149446414"/>
+      </p:ext>
+    </p:extLst>
+  </p:cSld>
+  <p:clrMapOvr>
+    <a:masterClrMapping/>
+  </p:clrMapOvr>
+</p:sld>
+</file>
+
 <file path=ppt/slides/slide2.xml><?xml version="1.0" encoding="utf-8"?>
 <p:sld xmlns:a="http://schemas.openxmlformats.org/drawingml/2006/main" xmlns:r="http://schemas.openxmlformats.org/officeDocument/2006/relationships" xmlns:p="http://schemas.openxmlformats.org/presentationml/2006/main">
   <p:cSld>
@@ -4136,6 +4824,47 @@
           <a:chExt cx="0" cy="0"/>
         </a:xfrm>
       </p:grpSpPr>
+      <p:pic>
+        <p:nvPicPr>
+          <p:cNvPr id="7182" name="Picture 14" descr="Image result for personal development"/>
+          <p:cNvPicPr>
+            <a:picLocks noChangeAspect="1" noChangeArrowheads="1"/>
+          </p:cNvPicPr>
+          <p:nvPr/>
+        </p:nvPicPr>
+        <p:blipFill>
+          <a:blip r:embed="rId2">
+            <a:extLst>
+              <a:ext uri="{28A0092B-C50C-407E-A947-70E740481C1C}">
+                <a14:useLocalDpi xmlns:a14="http://schemas.microsoft.com/office/drawing/2010/main" val="0"/>
+              </a:ext>
+            </a:extLst>
+          </a:blip>
+          <a:srcRect/>
+          <a:stretch>
+            <a:fillRect/>
+          </a:stretch>
+        </p:blipFill>
+        <p:spPr bwMode="auto">
+          <a:xfrm>
+            <a:off x="0" y="1052736"/>
+            <a:ext cx="9144000" cy="5805264"/>
+          </a:xfrm>
+          <a:prstGeom prst="rect">
+            <a:avLst/>
+          </a:prstGeom>
+          <a:noFill/>
+          <a:extLst>
+            <a:ext uri="{909E8E84-426E-40DD-AFC4-6F175D3DCCD1}">
+              <a14:hiddenFill xmlns:a14="http://schemas.microsoft.com/office/drawing/2010/main">
+                <a:solidFill>
+                  <a:srgbClr val="FFFFFF"/>
+                </a:solidFill>
+              </a14:hiddenFill>
+            </a:ext>
+          </a:extLst>
+        </p:spPr>
+      </p:pic>
       <p:sp>
         <p:nvSpPr>
           <p:cNvPr id="2" name="Title 1"/>
@@ -4183,7 +4912,11 @@
               <a:buChar char="•"/>
             </a:pPr>
             <a:r>
-              <a:rPr lang="en-IE" dirty="0" smtClean="0"/>
+              <a:rPr lang="en-IE" dirty="0" smtClean="0">
+                <a:solidFill>
+                  <a:schemeClr val="bg1"/>
+                </a:solidFill>
+              </a:rPr>
               <a:t>Self-awareness</a:t>
             </a:r>
           </a:p>
@@ -4193,11 +4926,19 @@
               <a:buChar char="•"/>
             </a:pPr>
             <a:r>
-              <a:rPr lang="en-IE" dirty="0"/>
+              <a:rPr lang="en-IE" dirty="0">
+                <a:solidFill>
+                  <a:schemeClr val="bg1"/>
+                </a:solidFill>
+              </a:rPr>
               <a:t>A sense of </a:t>
             </a:r>
             <a:r>
-              <a:rPr lang="en-IE" dirty="0" smtClean="0"/>
+              <a:rPr lang="en-IE" dirty="0" smtClean="0">
+                <a:solidFill>
+                  <a:schemeClr val="bg1"/>
+                </a:solidFill>
+              </a:rPr>
               <a:t>direction</a:t>
             </a:r>
           </a:p>
@@ -4207,11 +4948,27 @@
               <a:buChar char="•"/>
             </a:pPr>
             <a:r>
-              <a:rPr lang="en-IE" dirty="0"/>
-              <a:t>Improved focus and </a:t>
-            </a:r>
-            <a:r>
-              <a:rPr lang="en-IE" dirty="0" smtClean="0"/>
+              <a:rPr lang="en-IE" dirty="0" smtClean="0">
+                <a:solidFill>
+                  <a:schemeClr val="bg1"/>
+                </a:solidFill>
+              </a:rPr>
+              <a:t>Improve </a:t>
+            </a:r>
+            <a:r>
+              <a:rPr lang="en-IE" dirty="0">
+                <a:solidFill>
+                  <a:schemeClr val="bg1"/>
+                </a:solidFill>
+              </a:rPr>
+              <a:t>focus and </a:t>
+            </a:r>
+            <a:r>
+              <a:rPr lang="en-IE" dirty="0" smtClean="0">
+                <a:solidFill>
+                  <a:schemeClr val="bg1"/>
+                </a:solidFill>
+              </a:rPr>
               <a:t>effectiveness</a:t>
             </a:r>
           </a:p>
@@ -4221,11 +4978,19 @@
               <a:buChar char="•"/>
             </a:pPr>
             <a:r>
-              <a:rPr lang="en-IE" dirty="0"/>
+              <a:rPr lang="en-IE" dirty="0">
+                <a:solidFill>
+                  <a:schemeClr val="bg1"/>
+                </a:solidFill>
+              </a:rPr>
               <a:t>More </a:t>
             </a:r>
             <a:r>
-              <a:rPr lang="en-IE" dirty="0" smtClean="0"/>
+              <a:rPr lang="en-IE" dirty="0" smtClean="0">
+                <a:solidFill>
+                  <a:schemeClr val="bg1"/>
+                </a:solidFill>
+              </a:rPr>
               <a:t>motivation</a:t>
             </a:r>
           </a:p>
@@ -4235,11 +5000,19 @@
               <a:buChar char="•"/>
             </a:pPr>
             <a:r>
-              <a:rPr lang="en-IE" dirty="0"/>
+              <a:rPr lang="en-IE" dirty="0">
+                <a:solidFill>
+                  <a:schemeClr val="bg1"/>
+                </a:solidFill>
+              </a:rPr>
               <a:t>Greater </a:t>
             </a:r>
             <a:r>
-              <a:rPr lang="en-IE" dirty="0" smtClean="0"/>
+              <a:rPr lang="en-IE" dirty="0" smtClean="0">
+                <a:solidFill>
+                  <a:schemeClr val="bg1"/>
+                </a:solidFill>
+              </a:rPr>
               <a:t>resilience</a:t>
             </a:r>
           </a:p>
@@ -4249,7 +5022,11 @@
               <a:buChar char="•"/>
             </a:pPr>
             <a:r>
-              <a:rPr lang="en-IE" dirty="0"/>
+              <a:rPr lang="en-IE" dirty="0">
+                <a:solidFill>
+                  <a:schemeClr val="bg1"/>
+                </a:solidFill>
+              </a:rPr>
               <a:t> More fulfilling relationships</a:t>
             </a:r>
           </a:p>
@@ -4265,6 +5042,13 @@
   <p:clrMapOvr>
     <a:masterClrMapping/>
   </p:clrMapOvr>
+  <p:timing>
+    <p:tnLst>
+      <p:par>
+        <p:cTn id="1" dur="indefinite" restart="never" nodeType="tmRoot"/>
+      </p:par>
+    </p:tnLst>
+  </p:timing>
 </p:sld>
 </file>
 
@@ -4298,13 +5082,32 @@
         <p:spPr/>
         <p:txBody>
           <a:bodyPr>
-            <a:normAutofit/>
+            <a:normAutofit fontScale="90000"/>
           </a:bodyPr>
           <a:lstStyle/>
           <a:p>
+            <a:pPr algn="l"/>
             <a:r>
               <a:rPr lang="en-IE" dirty="0" smtClean="0"/>
-              <a:t>Benefits of Professional Development</a:t>
+              <a:t>Benefits of </a:t>
+            </a:r>
+            <a:r>
+              <a:rPr lang="en-IE" dirty="0" smtClean="0"/>
+              <a:t/>
+            </a:r>
+            <a:br>
+              <a:rPr lang="en-IE" dirty="0" smtClean="0"/>
+            </a:br>
+            <a:r>
+              <a:rPr lang="en-IE" dirty="0" smtClean="0"/>
+              <a:t>Professional </a:t>
+            </a:r>
+            <a:br>
+              <a:rPr lang="en-IE" dirty="0" smtClean="0"/>
+            </a:br>
+            <a:r>
+              <a:rPr lang="en-IE" dirty="0" smtClean="0"/>
+              <a:t>Development</a:t>
             </a:r>
             <a:endParaRPr lang="en-IE" dirty="0"/>
           </a:p>
@@ -4391,10 +5194,91 @@
               <a:rPr lang="en-IE" dirty="0"/>
               <a:t>Reenergize your ideas</a:t>
             </a:r>
-            <a:endParaRPr lang="en-IE" dirty="0"/>
-          </a:p>
-        </p:txBody>
-      </p:sp>
+          </a:p>
+        </p:txBody>
+      </p:sp>
+      <p:pic>
+        <p:nvPicPr>
+          <p:cNvPr id="6146" name="Picture 2" descr="Image result for professional development"/>
+          <p:cNvPicPr>
+            <a:picLocks noChangeAspect="1" noChangeArrowheads="1"/>
+          </p:cNvPicPr>
+          <p:nvPr/>
+        </p:nvPicPr>
+        <p:blipFill>
+          <a:blip r:embed="rId2">
+            <a:extLst>
+              <a:ext uri="{28A0092B-C50C-407E-A947-70E740481C1C}">
+                <a14:useLocalDpi xmlns:a14="http://schemas.microsoft.com/office/drawing/2010/main" val="0"/>
+              </a:ext>
+            </a:extLst>
+          </a:blip>
+          <a:srcRect/>
+          <a:stretch>
+            <a:fillRect/>
+          </a:stretch>
+        </p:blipFill>
+        <p:spPr bwMode="auto">
+          <a:xfrm>
+            <a:off x="5611146" y="764704"/>
+            <a:ext cx="3519061" cy="2340176"/>
+          </a:xfrm>
+          <a:prstGeom prst="rect">
+            <a:avLst/>
+          </a:prstGeom>
+          <a:noFill/>
+          <a:extLst>
+            <a:ext uri="{909E8E84-426E-40DD-AFC4-6F175D3DCCD1}">
+              <a14:hiddenFill xmlns:a14="http://schemas.microsoft.com/office/drawing/2010/main">
+                <a:solidFill>
+                  <a:srgbClr val="FFFFFF"/>
+                </a:solidFill>
+              </a14:hiddenFill>
+            </a:ext>
+          </a:extLst>
+        </p:spPr>
+      </p:pic>
+      <p:pic>
+        <p:nvPicPr>
+          <p:cNvPr id="6148" name="Picture 4" descr="Image result for self learning quotes"/>
+          <p:cNvPicPr>
+            <a:picLocks noChangeAspect="1" noChangeArrowheads="1"/>
+          </p:cNvPicPr>
+          <p:nvPr/>
+        </p:nvPicPr>
+        <p:blipFill>
+          <a:blip r:embed="rId3">
+            <a:extLst>
+              <a:ext uri="{28A0092B-C50C-407E-A947-70E740481C1C}">
+                <a14:useLocalDpi xmlns:a14="http://schemas.microsoft.com/office/drawing/2010/main" val="0"/>
+              </a:ext>
+            </a:extLst>
+          </a:blip>
+          <a:srcRect/>
+          <a:stretch>
+            <a:fillRect/>
+          </a:stretch>
+        </p:blipFill>
+        <p:spPr bwMode="auto">
+          <a:xfrm>
+            <a:off x="899592" y="4941168"/>
+            <a:ext cx="7128792" cy="2003648"/>
+          </a:xfrm>
+          <a:prstGeom prst="rect">
+            <a:avLst/>
+          </a:prstGeom>
+          <a:noFill/>
+          <a:extLst>
+            <a:ext uri="{909E8E84-426E-40DD-AFC4-6F175D3DCCD1}">
+              <a14:hiddenFill xmlns:a14="http://schemas.microsoft.com/office/drawing/2010/main">
+                <a:solidFill>
+                  <a:srgbClr val="FFFFFF"/>
+                </a:solidFill>
+              </a14:hiddenFill>
+            </a:ext>
+          </a:extLst>
+        </p:spPr>
+      </p:pic>
     </p:spTree>
     <p:extLst>
       <p:ext uri="{BB962C8B-B14F-4D97-AF65-F5344CB8AC3E}">
@@ -4405,6 +5289,13 @@
   <p:clrMapOvr>
     <a:masterClrMapping/>
   </p:clrMapOvr>
+  <p:timing>
+    <p:tnLst>
+      <p:par>
+        <p:cTn id="1" dur="indefinite" restart="never" nodeType="tmRoot"/>
+      </p:par>
+    </p:tnLst>
+  </p:timing>
 </p:sld>
 </file>
 
@@ -4425,6 +5316,47 @@
           <a:chExt cx="0" cy="0"/>
         </a:xfrm>
       </p:grpSpPr>
+      <p:pic>
+        <p:nvPicPr>
+          <p:cNvPr id="4" name="Picture 2" descr="Image result for opportunities"/>
+          <p:cNvPicPr>
+            <a:picLocks noChangeAspect="1" noChangeArrowheads="1"/>
+          </p:cNvPicPr>
+          <p:nvPr/>
+        </p:nvPicPr>
+        <p:blipFill>
+          <a:blip r:embed="rId2">
+            <a:extLst>
+              <a:ext uri="{28A0092B-C50C-407E-A947-70E740481C1C}">
+                <a14:useLocalDpi xmlns:a14="http://schemas.microsoft.com/office/drawing/2010/main" val="0"/>
+              </a:ext>
+            </a:extLst>
+          </a:blip>
+          <a:srcRect/>
+          <a:stretch>
+            <a:fillRect/>
+          </a:stretch>
+        </p:blipFill>
+        <p:spPr bwMode="auto">
+          <a:xfrm>
+            <a:off x="539552" y="1235900"/>
+            <a:ext cx="7438653" cy="4950341"/>
+          </a:xfrm>
+          <a:prstGeom prst="rect">
+            <a:avLst/>
+          </a:prstGeom>
+          <a:noFill/>
+          <a:extLst>
+            <a:ext uri="{909E8E84-426E-40DD-AFC4-6F175D3DCCD1}">
+              <a14:hiddenFill xmlns:a14="http://schemas.microsoft.com/office/drawing/2010/main">
+                <a:solidFill>
+                  <a:srgbClr val="FFFFFF"/>
+                </a:solidFill>
+              </a14:hiddenFill>
+            </a:ext>
+          </a:extLst>
+        </p:spPr>
+      </p:pic>
       <p:sp>
         <p:nvSpPr>
           <p:cNvPr id="2" name="Title 1"/>
@@ -4505,7 +5437,7 @@
         </p:nvSpPr>
         <p:spPr>
           <a:xfrm>
-            <a:off x="539552" y="4293096"/>
+            <a:off x="539552" y="3501008"/>
             <a:ext cx="7854696" cy="992552"/>
           </a:xfrm>
         </p:spPr>
@@ -4566,93 +5498,10 @@
               <a:buAutoNum type="arabicPeriod"/>
             </a:pPr>
             <a:r>
-              <a:rPr lang="en-IE" sz="2000" dirty="0"/>
-              <a:t>work </a:t>
-            </a:r>
-            <a:r>
-              <a:rPr lang="en-IE" sz="2000" dirty="0" smtClean="0"/>
-              <a:t>shadowing</a:t>
-            </a:r>
-          </a:p>
-          <a:p>
-            <a:pPr marL="514350" indent="-514350" algn="ctr">
-              <a:buFont typeface="+mj-lt"/>
-              <a:buAutoNum type="arabicPeriod"/>
-            </a:pPr>
-            <a:r>
-              <a:rPr lang="en-IE" sz="2000" dirty="0"/>
-              <a:t>internal knowledge sharing </a:t>
-            </a:r>
-            <a:r>
-              <a:rPr lang="en-IE" sz="2000" dirty="0" smtClean="0"/>
-              <a:t>events</a:t>
-            </a:r>
-          </a:p>
-          <a:p>
-            <a:pPr marL="514350" indent="-514350" algn="ctr">
-              <a:buFont typeface="+mj-lt"/>
-              <a:buAutoNum type="arabicPeriod"/>
-            </a:pPr>
-            <a:r>
-              <a:rPr lang="en-IE" sz="2000" dirty="0"/>
-              <a:t>job </a:t>
-            </a:r>
-            <a:r>
-              <a:rPr lang="en-IE" sz="2000" dirty="0" smtClean="0"/>
-              <a:t>rotation</a:t>
-            </a:r>
-          </a:p>
-          <a:p>
-            <a:pPr marL="514350" indent="-514350" algn="ctr">
-              <a:buFont typeface="+mj-lt"/>
-              <a:buAutoNum type="arabicPeriod"/>
-            </a:pPr>
-            <a:r>
-              <a:rPr lang="en-IE" sz="2000" dirty="0"/>
-              <a:t>new assignments and work </a:t>
-            </a:r>
-            <a:r>
-              <a:rPr lang="en-IE" sz="2000" dirty="0" smtClean="0"/>
-              <a:t>experience</a:t>
-            </a:r>
-          </a:p>
-          <a:p>
-            <a:pPr marL="514350" indent="-514350" algn="ctr">
-              <a:buFont typeface="+mj-lt"/>
-              <a:buAutoNum type="arabicPeriod"/>
-            </a:pPr>
-            <a:r>
-              <a:rPr lang="en-IE" sz="2000" dirty="0"/>
-              <a:t>reading books, articles, and watching </a:t>
-            </a:r>
-            <a:r>
-              <a:rPr lang="en-IE" sz="2000" dirty="0" smtClean="0"/>
-              <a:t>DVDs</a:t>
-            </a:r>
-          </a:p>
-          <a:p>
-            <a:pPr marL="514350" indent="-514350" algn="ctr">
-              <a:buFont typeface="+mj-lt"/>
-              <a:buAutoNum type="arabicPeriod"/>
-            </a:pPr>
-            <a:r>
-              <a:rPr lang="en-IE" sz="2000" dirty="0"/>
-              <a:t>starting a peer learning or action learning group</a:t>
-            </a:r>
-            <a:r>
-              <a:rPr lang="en-IE" sz="2000" dirty="0" smtClean="0"/>
-              <a:t>.</a:t>
-            </a:r>
-          </a:p>
-          <a:p>
-            <a:pPr marL="514350" indent="-514350" algn="ctr">
-              <a:buFont typeface="+mj-lt"/>
-              <a:buAutoNum type="arabicPeriod"/>
-            </a:pPr>
-            <a:r>
               <a:rPr lang="en-IE" sz="2000" dirty="0" smtClean="0"/>
               <a:t>Volunteering</a:t>
             </a:r>
+            <a:endParaRPr lang="en-IE" sz="2000" dirty="0" smtClean="0"/>
           </a:p>
         </p:txBody>
       </p:sp>
@@ -4686,6 +5535,47 @@
           <a:chExt cx="0" cy="0"/>
         </a:xfrm>
       </p:grpSpPr>
+      <p:pic>
+        <p:nvPicPr>
+          <p:cNvPr id="4100" name="Picture 4" descr="Image result for opportunities"/>
+          <p:cNvPicPr>
+            <a:picLocks noChangeAspect="1" noChangeArrowheads="1"/>
+          </p:cNvPicPr>
+          <p:nvPr/>
+        </p:nvPicPr>
+        <p:blipFill>
+          <a:blip r:embed="rId2">
+            <a:extLst>
+              <a:ext uri="{28A0092B-C50C-407E-A947-70E740481C1C}">
+                <a14:useLocalDpi xmlns:a14="http://schemas.microsoft.com/office/drawing/2010/main" val="0"/>
+              </a:ext>
+            </a:extLst>
+          </a:blip>
+          <a:srcRect/>
+          <a:stretch>
+            <a:fillRect/>
+          </a:stretch>
+        </p:blipFill>
+        <p:spPr bwMode="auto">
+          <a:xfrm>
+            <a:off x="740769" y="-531440"/>
+            <a:ext cx="7476832" cy="5688632"/>
+          </a:xfrm>
+          <a:prstGeom prst="rect">
+            <a:avLst/>
+          </a:prstGeom>
+          <a:noFill/>
+          <a:extLst>
+            <a:ext uri="{909E8E84-426E-40DD-AFC4-6F175D3DCCD1}">
+              <a14:hiddenFill xmlns:a14="http://schemas.microsoft.com/office/drawing/2010/main">
+                <a:solidFill>
+                  <a:srgbClr val="FFFFFF"/>
+                </a:solidFill>
+              </a14:hiddenFill>
+            </a:ext>
+          </a:extLst>
+        </p:spPr>
+      </p:pic>
       <p:sp>
         <p:nvSpPr>
           <p:cNvPr id="2" name="Title 1"/>
@@ -4712,7 +5602,13 @@
               <a:rPr lang="en-IE" b="0" dirty="0" smtClean="0">
                 <a:effectLst/>
               </a:rPr>
-              <a:t>Why these 10 opportunities</a:t>
+              <a:t>Why these </a:t>
+            </a:r>
+            <a:r>
+              <a:rPr lang="en-IE" b="0" dirty="0" smtClean="0">
+                <a:effectLst/>
+              </a:rPr>
+              <a:t>opportunities</a:t>
             </a:r>
             <a:endParaRPr lang="en-IE" dirty="0"/>
           </a:p>
@@ -4728,7 +5624,12 @@
             <p:ph type="subTitle" idx="1"/>
           </p:nvPr>
         </p:nvSpPr>
-        <p:spPr/>
+        <p:spPr>
+          <a:xfrm>
+            <a:off x="533400" y="3228536"/>
+            <a:ext cx="7854696" cy="1280584"/>
+          </a:xfrm>
+        </p:spPr>
         <p:txBody>
           <a:bodyPr numCol="2">
             <a:noAutofit/>
@@ -4740,9 +5641,10 @@
               <a:buAutoNum type="arabicPeriod"/>
             </a:pPr>
             <a:r>
-              <a:rPr lang="en-IE" sz="2000" dirty="0"/>
-              <a:t>Being coached or mentored</a:t>
-            </a:r>
+              <a:rPr lang="en-IE" sz="2000" dirty="0" smtClean="0"/>
+              <a:t>Benefit from others’ experiences</a:t>
+            </a:r>
+            <a:endParaRPr lang="en-IE" sz="2000" dirty="0"/>
           </a:p>
           <a:p>
             <a:pPr marL="514350" indent="-514350" algn="ctr">
@@ -4750,9 +5652,10 @@
               <a:buAutoNum type="arabicPeriod"/>
             </a:pPr>
             <a:r>
-              <a:rPr lang="en-IE" sz="2000" dirty="0"/>
-              <a:t>Advice from colleagues</a:t>
-            </a:r>
+              <a:rPr lang="en-IE" sz="2000" dirty="0" smtClean="0"/>
+              <a:t>Colleagues provide insight about corporate needs</a:t>
+            </a:r>
+            <a:endParaRPr lang="en-IE" sz="2000" dirty="0"/>
           </a:p>
           <a:p>
             <a:pPr marL="514350" indent="-514350" algn="ctr">
@@ -4760,9 +5663,10 @@
               <a:buAutoNum type="arabicPeriod"/>
             </a:pPr>
             <a:r>
-              <a:rPr lang="en-IE" sz="2000" dirty="0"/>
-              <a:t>e-learning</a:t>
-            </a:r>
+              <a:rPr lang="en-IE" sz="2000" dirty="0" smtClean="0"/>
+              <a:t>Learning at every stage is vital to career development</a:t>
+            </a:r>
+            <a:endParaRPr lang="en-IE" sz="2000" dirty="0"/>
           </a:p>
           <a:p>
             <a:pPr marL="514350" indent="-514350" algn="ctr">
@@ -4771,68 +5675,9 @@
             </a:pPr>
             <a:r>
               <a:rPr lang="en-IE" sz="2000" dirty="0"/>
-              <a:t>work shadowing</a:t>
-            </a:r>
-          </a:p>
-          <a:p>
-            <a:pPr marL="514350" indent="-514350" algn="ctr">
-              <a:buFont typeface="+mj-lt"/>
-              <a:buAutoNum type="arabicPeriod"/>
-            </a:pPr>
-            <a:r>
-              <a:rPr lang="en-IE" sz="2000" dirty="0"/>
-              <a:t>internal knowledge sharing events</a:t>
-            </a:r>
-          </a:p>
-          <a:p>
-            <a:pPr marL="514350" indent="-514350" algn="ctr">
-              <a:buFont typeface="+mj-lt"/>
-              <a:buAutoNum type="arabicPeriod"/>
-            </a:pPr>
-            <a:r>
-              <a:rPr lang="en-IE" sz="2000" dirty="0"/>
-              <a:t>job rotation</a:t>
-            </a:r>
-          </a:p>
-          <a:p>
-            <a:pPr marL="514350" indent="-514350" algn="ctr">
-              <a:buFont typeface="+mj-lt"/>
-              <a:buAutoNum type="arabicPeriod"/>
-            </a:pPr>
-            <a:r>
-              <a:rPr lang="en-IE" sz="2000" dirty="0"/>
-              <a:t>new assignments and work experience</a:t>
-            </a:r>
-          </a:p>
-          <a:p>
-            <a:pPr marL="514350" indent="-514350" algn="ctr">
-              <a:buFont typeface="+mj-lt"/>
-              <a:buAutoNum type="arabicPeriod"/>
-            </a:pPr>
-            <a:r>
-              <a:rPr lang="en-IE" sz="2000" dirty="0"/>
-              <a:t>reading books, articles, and watching DVDs</a:t>
-            </a:r>
-          </a:p>
-          <a:p>
-            <a:pPr marL="514350" indent="-514350" algn="ctr">
-              <a:buFont typeface="+mj-lt"/>
-              <a:buAutoNum type="arabicPeriod"/>
-            </a:pPr>
-            <a:r>
-              <a:rPr lang="en-IE" sz="2000" dirty="0"/>
-              <a:t>starting a peer learning or action learning group.</a:t>
-            </a:r>
-          </a:p>
-          <a:p>
-            <a:pPr marL="514350" indent="-514350" algn="ctr">
-              <a:buFont typeface="+mj-lt"/>
-              <a:buAutoNum type="arabicPeriod"/>
-            </a:pPr>
-            <a:r>
-              <a:rPr lang="en-IE" sz="2000" dirty="0"/>
-              <a:t>Volunteering</a:t>
-            </a:r>
+              <a:t>Learn while helping others</a:t>
+            </a:r>
+            <a:endParaRPr lang="en-IE" sz="2000" dirty="0"/>
           </a:p>
           <a:p>
             <a:pPr marL="514350" indent="-514350" algn="ctr">
@@ -4873,6 +5718,47 @@
           <a:chExt cx="0" cy="0"/>
         </a:xfrm>
       </p:grpSpPr>
+      <p:pic>
+        <p:nvPicPr>
+          <p:cNvPr id="3074" name="Picture 2" descr="Image result for monk"/>
+          <p:cNvPicPr>
+            <a:picLocks noChangeAspect="1" noChangeArrowheads="1"/>
+          </p:cNvPicPr>
+          <p:nvPr/>
+        </p:nvPicPr>
+        <p:blipFill>
+          <a:blip r:embed="rId3">
+            <a:extLst>
+              <a:ext uri="{28A0092B-C50C-407E-A947-70E740481C1C}">
+                <a14:useLocalDpi xmlns:a14="http://schemas.microsoft.com/office/drawing/2010/main" val="0"/>
+              </a:ext>
+            </a:extLst>
+          </a:blip>
+          <a:srcRect/>
+          <a:stretch>
+            <a:fillRect/>
+          </a:stretch>
+        </p:blipFill>
+        <p:spPr bwMode="auto">
+          <a:xfrm>
+            <a:off x="155575" y="1736910"/>
+            <a:ext cx="6792689" cy="5094517"/>
+          </a:xfrm>
+          <a:prstGeom prst="rect">
+            <a:avLst/>
+          </a:prstGeom>
+          <a:noFill/>
+          <a:extLst>
+            <a:ext uri="{909E8E84-426E-40DD-AFC4-6F175D3DCCD1}">
+              <a14:hiddenFill xmlns:a14="http://schemas.microsoft.com/office/drawing/2010/main">
+                <a:solidFill>
+                  <a:srgbClr val="FFFFFF"/>
+                </a:solidFill>
+              </a14:hiddenFill>
+            </a:ext>
+          </a:extLst>
+        </p:spPr>
+      </p:pic>
       <p:sp>
         <p:nvSpPr>
           <p:cNvPr id="2" name="Title 1"/>
@@ -4892,13 +5778,7 @@
               <a:rPr lang="en-IE" b="0" dirty="0" smtClean="0">
                 <a:effectLst/>
               </a:rPr>
-              <a:t>How to r</a:t>
-            </a:r>
-            <a:r>
-              <a:rPr lang="en-IE" b="0" dirty="0" smtClean="0">
-                <a:effectLst/>
-              </a:rPr>
-              <a:t>eflect</a:t>
+              <a:t>How to reflect</a:t>
             </a:r>
             <a:endParaRPr lang="en-IE" dirty="0"/>
           </a:p>
@@ -5019,12 +5899,33 @@
         </p:nvSpPr>
         <p:spPr/>
         <p:txBody>
-          <a:bodyPr/>
-          <a:lstStyle/>
-          <a:p>
+          <a:bodyPr>
+            <a:normAutofit fontScale="90000"/>
+          </a:bodyPr>
+          <a:lstStyle/>
+          <a:p>
+            <a:pPr algn="ctr"/>
             <a:r>
               <a:rPr lang="en-IE" dirty="0" smtClean="0"/>
-              <a:t>Benefits of Reflection</a:t>
+              <a:t>Benefits </a:t>
+            </a:r>
+            <a:r>
+              <a:rPr lang="en-IE" dirty="0" smtClean="0"/>
+              <a:t/>
+            </a:r>
+            <a:br>
+              <a:rPr lang="en-IE" dirty="0" smtClean="0"/>
+            </a:br>
+            <a:r>
+              <a:rPr lang="en-IE" dirty="0" smtClean="0"/>
+              <a:t>of </a:t>
+            </a:r>
+            <a:br>
+              <a:rPr lang="en-IE" dirty="0" smtClean="0"/>
+            </a:br>
+            <a:r>
+              <a:rPr lang="en-IE" dirty="0" smtClean="0"/>
+              <a:t>Reflection</a:t>
             </a:r>
             <a:endParaRPr lang="en-IE" dirty="0"/>
           </a:p>
@@ -5093,6 +5994,47 @@
           </a:p>
         </p:txBody>
       </p:sp>
+      <p:pic>
+        <p:nvPicPr>
+          <p:cNvPr id="1026" name="Picture 2" descr="http://www.pivotpointministries.org/wp-content/uploads/2012/03/reflection-24.jpg"/>
+          <p:cNvPicPr>
+            <a:picLocks noChangeAspect="1" noChangeArrowheads="1"/>
+          </p:cNvPicPr>
+          <p:nvPr/>
+        </p:nvPicPr>
+        <p:blipFill>
+          <a:blip r:embed="rId3">
+            <a:extLst>
+              <a:ext uri="{28A0092B-C50C-407E-A947-70E740481C1C}">
+                <a14:useLocalDpi xmlns:a14="http://schemas.microsoft.com/office/drawing/2010/main" val="0"/>
+              </a:ext>
+            </a:extLst>
+          </a:blip>
+          <a:srcRect/>
+          <a:stretch>
+            <a:fillRect/>
+          </a:stretch>
+        </p:blipFill>
+        <p:spPr bwMode="auto">
+          <a:xfrm>
+            <a:off x="0" y="3573016"/>
+            <a:ext cx="4945518" cy="3278696"/>
+          </a:xfrm>
+          <a:prstGeom prst="rect">
+            <a:avLst/>
+          </a:prstGeom>
+          <a:noFill/>
+          <a:extLst>
+            <a:ext uri="{909E8E84-426E-40DD-AFC4-6F175D3DCCD1}">
+              <a14:hiddenFill xmlns:a14="http://schemas.microsoft.com/office/drawing/2010/main">
+                <a:solidFill>
+                  <a:srgbClr val="FFFFFF"/>
+                </a:solidFill>
+              </a14:hiddenFill>
+            </a:ext>
+          </a:extLst>
+        </p:spPr>
+      </p:pic>
     </p:spTree>
     <p:extLst>
       <p:ext uri="{BB962C8B-B14F-4D97-AF65-F5344CB8AC3E}">
@@ -5123,6 +6065,47 @@
           <a:chExt cx="0" cy="0"/>
         </a:xfrm>
       </p:grpSpPr>
+      <p:pic>
+        <p:nvPicPr>
+          <p:cNvPr id="2050" name="Picture 2" descr="http://www.enspire.com/wp-content/uploads/2014/02/LDS_Art_Home.png"/>
+          <p:cNvPicPr>
+            <a:picLocks noChangeAspect="1" noChangeArrowheads="1"/>
+          </p:cNvPicPr>
+          <p:nvPr/>
+        </p:nvPicPr>
+        <p:blipFill>
+          <a:blip r:embed="rId2">
+            <a:extLst>
+              <a:ext uri="{28A0092B-C50C-407E-A947-70E740481C1C}">
+                <a14:useLocalDpi xmlns:a14="http://schemas.microsoft.com/office/drawing/2010/main" val="0"/>
+              </a:ext>
+            </a:extLst>
+          </a:blip>
+          <a:srcRect/>
+          <a:stretch>
+            <a:fillRect/>
+          </a:stretch>
+        </p:blipFill>
+        <p:spPr bwMode="auto">
+          <a:xfrm>
+            <a:off x="3635896" y="476672"/>
+            <a:ext cx="5986754" cy="4058816"/>
+          </a:xfrm>
+          <a:prstGeom prst="rect">
+            <a:avLst/>
+          </a:prstGeom>
+          <a:noFill/>
+          <a:extLst>
+            <a:ext uri="{909E8E84-426E-40DD-AFC4-6F175D3DCCD1}">
+              <a14:hiddenFill xmlns:a14="http://schemas.microsoft.com/office/drawing/2010/main">
+                <a:solidFill>
+                  <a:srgbClr val="FFFFFF"/>
+                </a:solidFill>
+              </a14:hiddenFill>
+            </a:ext>
+          </a:extLst>
+        </p:spPr>
+      </p:pic>
       <p:sp>
         <p:nvSpPr>
           <p:cNvPr id="2" name="Title 1"/>
@@ -5135,9 +6118,12 @@
         </p:nvSpPr>
         <p:spPr/>
         <p:txBody>
-          <a:bodyPr/>
-          <a:lstStyle/>
-          <a:p>
+          <a:bodyPr>
+            <a:normAutofit fontScale="90000"/>
+          </a:bodyPr>
+          <a:lstStyle/>
+          <a:p>
+            <a:pPr algn="l"/>
             <a:r>
               <a:rPr lang="en-IE" b="0" dirty="0">
                 <a:effectLst/>
@@ -5160,7 +6146,35 @@
               <a:rPr lang="en-IE" b="0" dirty="0" smtClean="0">
                 <a:effectLst/>
               </a:rPr>
-              <a:t>How People Learn</a:t>
+              <a:t/>
+            </a:r>
+            <a:br>
+              <a:rPr lang="en-IE" b="0" dirty="0" smtClean="0">
+                <a:effectLst/>
+              </a:rPr>
+            </a:br>
+            <a:r>
+              <a:rPr lang="en-IE" b="0" dirty="0" smtClean="0">
+                <a:effectLst/>
+              </a:rPr>
+              <a:t>How </a:t>
+            </a:r>
+            <a:br>
+              <a:rPr lang="en-IE" b="0" dirty="0" smtClean="0">
+                <a:effectLst/>
+              </a:rPr>
+            </a:br>
+            <a:r>
+              <a:rPr lang="en-IE" b="0" dirty="0" smtClean="0">
+                <a:effectLst/>
+              </a:rPr>
+              <a:t>People </a:t>
+            </a:r>
+            <a:r>
+              <a:rPr lang="en-IE" b="0" dirty="0" smtClean="0">
+                <a:effectLst/>
+              </a:rPr>
+              <a:t>Learn</a:t>
             </a:r>
             <a:endParaRPr lang="en-IE" dirty="0"/>
           </a:p>
@@ -5176,92 +6190,70 @@
             <p:ph type="subTitle" idx="1"/>
           </p:nvPr>
         </p:nvSpPr>
-        <p:spPr/>
+        <p:spPr>
+          <a:xfrm>
+            <a:off x="539552" y="4149080"/>
+            <a:ext cx="7854696" cy="1752600"/>
+          </a:xfrm>
+        </p:spPr>
         <p:txBody>
           <a:bodyPr>
-            <a:normAutofit fontScale="40000" lnSpcReduction="20000"/>
+            <a:normAutofit fontScale="70000" lnSpcReduction="20000"/>
           </a:bodyPr>
           <a:lstStyle/>
           <a:p>
-            <a:pPr marL="514350" indent="-514350">
+            <a:pPr marL="514350" indent="-514350" algn="l">
               <a:buFont typeface="Arial" pitchFamily="34" charset="0"/>
               <a:buChar char="•"/>
             </a:pPr>
             <a:r>
-              <a:rPr lang="en-IE" dirty="0"/>
-              <a:t>Students learn new ideas by relating them to what they already know, and then transferring them into their long-term memory</a:t>
-            </a:r>
-            <a:r>
               <a:rPr lang="en-IE" dirty="0" smtClean="0"/>
-              <a:t>.</a:t>
-            </a:r>
-          </a:p>
-          <a:p>
-            <a:pPr marL="514350" indent="-514350">
+              <a:t>We learn from relating new info to what we already know</a:t>
+            </a:r>
+          </a:p>
+          <a:p>
+            <a:pPr marL="514350" indent="-514350" algn="l">
               <a:buFont typeface="Arial" pitchFamily="34" charset="0"/>
               <a:buChar char="•"/>
             </a:pPr>
             <a:r>
-              <a:rPr lang="en-IE" dirty="0"/>
-              <a:t>Students remember information better when they are given many opportunities to practice retrieving it from their long-term memories and think about its meaning</a:t>
-            </a:r>
-            <a:r>
               <a:rPr lang="en-IE" dirty="0" smtClean="0"/>
-              <a:t>.</a:t>
-            </a:r>
-          </a:p>
-          <a:p>
-            <a:pPr marL="514350" indent="-514350">
+              <a:t>We remember better when we employ new knowledge</a:t>
+            </a:r>
+          </a:p>
+          <a:p>
+            <a:pPr marL="514350" indent="-514350" algn="l">
               <a:buFont typeface="Arial" pitchFamily="34" charset="0"/>
               <a:buChar char="•"/>
             </a:pPr>
             <a:r>
-              <a:rPr lang="en-IE" dirty="0"/>
-              <a:t>Problem-solving and critical-thinking skills are developed through feedback and depend heavily upon background knowledge</a:t>
-            </a:r>
-            <a:r>
               <a:rPr lang="en-IE" dirty="0" smtClean="0"/>
-              <a:t>.</a:t>
-            </a:r>
-          </a:p>
-          <a:p>
-            <a:pPr marL="514350" indent="-514350">
+              <a:t>Logical thinking develops </a:t>
+            </a:r>
+            <a:r>
+              <a:rPr lang="en-IE" dirty="0" smtClean="0"/>
+              <a:t>primarily through feedback</a:t>
+            </a:r>
+          </a:p>
+          <a:p>
+            <a:pPr marL="514350" indent="-514350" algn="l">
               <a:buFont typeface="Arial" pitchFamily="34" charset="0"/>
               <a:buChar char="•"/>
             </a:pPr>
             <a:r>
-              <a:rPr lang="en-IE" dirty="0"/>
-              <a:t>For students to transfer their abilities to new situations, they need to deeply understand both the problem's structure and context</a:t>
-            </a:r>
-            <a:r>
               <a:rPr lang="en-IE" dirty="0" smtClean="0"/>
-              <a:t>.</a:t>
-            </a:r>
-          </a:p>
-          <a:p>
-            <a:pPr marL="514350" indent="-514350">
+              <a:t>A deep understanding is required to apply abilities in new situations</a:t>
+            </a:r>
+          </a:p>
+          <a:p>
+            <a:pPr marL="514350" indent="-514350" algn="l">
               <a:buFont typeface="Arial" pitchFamily="34" charset="0"/>
               <a:buChar char="•"/>
             </a:pPr>
             <a:r>
-              <a:rPr lang="en-IE" dirty="0"/>
-              <a:t>Student motivation depends on a variety of social and psychological factors</a:t>
-            </a:r>
-            <a:r>
               <a:rPr lang="en-IE" dirty="0" smtClean="0"/>
-              <a:t>.</a:t>
-            </a:r>
-          </a:p>
-          <a:p>
-            <a:pPr marL="514350" indent="-514350">
-              <a:buFont typeface="Arial" pitchFamily="34" charset="0"/>
-              <a:buChar char="•"/>
-            </a:pPr>
-            <a:r>
-              <a:rPr lang="en-IE" dirty="0"/>
-              <a:t> Misconceptions about learning, while prevalent in education, shouldn't determine how curricula are designed or how instruction is provided.</a:t>
-            </a:r>
-            <a:endParaRPr lang="en-IE" dirty="0"/>
+              <a:t>Social and psychological states heavily affect learning potential</a:t>
+            </a:r>
           </a:p>
         </p:txBody>
       </p:sp>
@@ -5307,9 +6299,10 @@
         </p:nvSpPr>
         <p:spPr/>
         <p:txBody>
-          <a:bodyPr/>
-          <a:lstStyle/>
-          <a:p>
+          <a:bodyPr anchor="ctr"/>
+          <a:lstStyle/>
+          <a:p>
+            <a:pPr algn="ctr"/>
             <a:r>
               <a:rPr lang="en-IE" dirty="0" smtClean="0"/>
               <a:t>How to learn</a:t>
@@ -5336,11 +6329,11 @@
         </p:spPr>
         <p:txBody>
           <a:bodyPr numCol="3">
-            <a:normAutofit fontScale="92500" lnSpcReduction="20000"/>
+            <a:normAutofit fontScale="92500" lnSpcReduction="10000"/>
           </a:bodyPr>
           <a:lstStyle/>
           <a:p>
-            <a:pPr marL="514350" indent="-514350">
+            <a:pPr marL="514350" indent="-514350" algn="ctr">
               <a:buFont typeface="+mj-lt"/>
               <a:buAutoNum type="arabicPeriod"/>
             </a:pPr>
@@ -5350,7 +6343,7 @@
             </a:r>
           </a:p>
           <a:p>
-            <a:pPr marL="514350" indent="-514350">
+            <a:pPr marL="514350" indent="-514350" algn="ctr">
               <a:buFont typeface="+mj-lt"/>
               <a:buAutoNum type="arabicPeriod"/>
             </a:pPr>
@@ -5360,7 +6353,7 @@
             </a:r>
           </a:p>
           <a:p>
-            <a:pPr marL="514350" indent="-514350">
+            <a:pPr marL="514350" indent="-514350" algn="ctr">
               <a:buFont typeface="+mj-lt"/>
               <a:buAutoNum type="arabicPeriod"/>
             </a:pPr>
@@ -5370,21 +6363,21 @@
             </a:r>
           </a:p>
           <a:p>
-            <a:pPr marL="514350" indent="-514350">
+            <a:pPr marL="514350" indent="-514350" algn="ctr">
               <a:buFont typeface="+mj-lt"/>
               <a:buAutoNum type="arabicPeriod"/>
             </a:pPr>
             <a:r>
               <a:rPr lang="en-IE" dirty="0" smtClean="0"/>
-              <a:t>Allow </a:t>
+              <a:t>Independent </a:t>
             </a:r>
             <a:r>
               <a:rPr lang="en-IE" dirty="0"/>
-              <a:t>Independent Exploration</a:t>
-            </a:r>
-          </a:p>
-          <a:p>
-            <a:pPr marL="514350" indent="-514350">
+              <a:t>Exploration</a:t>
+            </a:r>
+          </a:p>
+          <a:p>
+            <a:pPr marL="514350" indent="-514350" algn="ctr">
               <a:buFont typeface="+mj-lt"/>
               <a:buAutoNum type="arabicPeriod"/>
             </a:pPr>
@@ -5394,7 +6387,7 @@
             </a:r>
           </a:p>
           <a:p>
-            <a:pPr marL="514350" indent="-514350">
+            <a:pPr marL="514350" indent="-514350" algn="ctr">
               <a:buFont typeface="+mj-lt"/>
               <a:buAutoNum type="arabicPeriod"/>
             </a:pPr>
@@ -5404,7 +6397,7 @@
             </a:r>
           </a:p>
           <a:p>
-            <a:pPr marL="514350" indent="-514350">
+            <a:pPr marL="514350" indent="-514350" algn="ctr">
               <a:buFont typeface="+mj-lt"/>
               <a:buAutoNum type="arabicPeriod"/>
             </a:pPr>
@@ -5414,7 +6407,7 @@
             </a:r>
           </a:p>
           <a:p>
-            <a:pPr marL="514350" indent="-514350">
+            <a:pPr marL="514350" indent="-514350" algn="ctr">
               <a:buFont typeface="+mj-lt"/>
               <a:buAutoNum type="arabicPeriod"/>
             </a:pPr>
@@ -5424,7 +6417,7 @@
             </a:r>
           </a:p>
           <a:p>
-            <a:pPr marL="514350" indent="-514350">
+            <a:pPr marL="514350" indent="-514350" algn="ctr">
               <a:buFont typeface="+mj-lt"/>
               <a:buAutoNum type="arabicPeriod"/>
             </a:pPr>
@@ -5434,7 +6427,7 @@
             </a:r>
           </a:p>
           <a:p>
-            <a:pPr marL="514350" indent="-514350">
+            <a:pPr marL="514350" indent="-514350" algn="ctr">
               <a:buFont typeface="+mj-lt"/>
               <a:buAutoNum type="arabicPeriod"/>
             </a:pPr>
@@ -5444,7 +6437,7 @@
             </a:r>
           </a:p>
           <a:p>
-            <a:pPr marL="514350" indent="-514350">
+            <a:pPr marL="514350" indent="-514350" algn="ctr">
               <a:buFont typeface="+mj-lt"/>
               <a:buAutoNum type="arabicPeriod"/>
             </a:pPr>
@@ -5452,10 +6445,50 @@
               <a:rPr lang="en-IE" dirty="0"/>
               <a:t>Keep Learning</a:t>
             </a:r>
-            <a:endParaRPr lang="en-IE" dirty="0"/>
-          </a:p>
-        </p:txBody>
-      </p:sp>
+          </a:p>
+        </p:txBody>
+      </p:sp>
+      <p:pic>
+        <p:nvPicPr>
+          <p:cNvPr id="8194" name="Picture 2" descr="Image result for self learning quotes"/>
+          <p:cNvPicPr>
+            <a:picLocks noChangeAspect="1" noChangeArrowheads="1"/>
+          </p:cNvPicPr>
+          <p:nvPr/>
+        </p:nvPicPr>
+        <p:blipFill>
+          <a:blip r:embed="rId2">
+            <a:extLst>
+              <a:ext uri="{28A0092B-C50C-407E-A947-70E740481C1C}">
+                <a14:useLocalDpi xmlns:a14="http://schemas.microsoft.com/office/drawing/2010/main" val="0"/>
+              </a:ext>
+            </a:extLst>
+          </a:blip>
+          <a:srcRect/>
+          <a:stretch>
+            <a:fillRect/>
+          </a:stretch>
+        </p:blipFill>
+        <p:spPr bwMode="auto">
+          <a:xfrm>
+            <a:off x="6516216" y="877888"/>
+            <a:ext cx="2594519" cy="1839048"/>
+          </a:xfrm>
+          <a:prstGeom prst="rect">
+            <a:avLst/>
+          </a:prstGeom>
+          <a:noFill/>
+          <a:extLst>
+            <a:ext uri="{909E8E84-426E-40DD-AFC4-6F175D3DCCD1}">
+              <a14:hiddenFill xmlns:a14="http://schemas.microsoft.com/office/drawing/2010/main">
+                <a:solidFill>
+                  <a:srgbClr val="FFFFFF"/>
+                </a:solidFill>
+              </a14:hiddenFill>
+            </a:ext>
+          </a:extLst>
+        </p:spPr>
+      </p:pic>
     </p:spTree>
     <p:extLst>
       <p:ext uri="{BB962C8B-B14F-4D97-AF65-F5344CB8AC3E}">
@@ -5466,6 +6499,13 @@
   <p:clrMapOvr>
     <a:masterClrMapping/>
   </p:clrMapOvr>
+  <p:timing>
+    <p:tnLst>
+      <p:par>
+        <p:cTn id="1" dur="indefinite" restart="never" nodeType="tmRoot"/>
+      </p:par>
+    </p:tnLst>
+  </p:timing>
 </p:sld>
 </file>
 
@@ -5762,4 +6802,289 @@
   <a:objectDefaults/>
   <a:extraClrSchemeLst/>
 </a:theme>
+</file>
+
+<file path=ppt/theme/theme2.xml><?xml version="1.0" encoding="utf-8"?>
+<a:theme xmlns:a="http://schemas.openxmlformats.org/drawingml/2006/main" name="Office Theme">
+  <a:themeElements>
+    <a:clrScheme name="Office">
+      <a:dk1>
+        <a:sysClr val="windowText" lastClr="000000"/>
+      </a:dk1>
+      <a:lt1>
+        <a:sysClr val="window" lastClr="FFFFFF"/>
+      </a:lt1>
+      <a:dk2>
+        <a:srgbClr val="1F497D"/>
+      </a:dk2>
+      <a:lt2>
+        <a:srgbClr val="EEECE1"/>
+      </a:lt2>
+      <a:accent1>
+        <a:srgbClr val="4F81BD"/>
+      </a:accent1>
+      <a:accent2>
+        <a:srgbClr val="C0504D"/>
+      </a:accent2>
+      <a:accent3>
+        <a:srgbClr val="9BBB59"/>
+      </a:accent3>
+      <a:accent4>
+        <a:srgbClr val="8064A2"/>
+      </a:accent4>
+      <a:accent5>
+        <a:srgbClr val="4BACC6"/>
+      </a:accent5>
+      <a:accent6>
+        <a:srgbClr val="F79646"/>
+      </a:accent6>
+      <a:hlink>
+        <a:srgbClr val="0000FF"/>
+      </a:hlink>
+      <a:folHlink>
+        <a:srgbClr val="800080"/>
+      </a:folHlink>
+    </a:clrScheme>
+    <a:fontScheme name="Office">
+      <a:majorFont>
+        <a:latin typeface="Calibri"/>
+        <a:ea typeface=""/>
+        <a:cs typeface=""/>
+        <a:font script="Jpan" typeface="ＭＳ Ｐゴシック"/>
+        <a:font script="Hang" typeface="맑은 고딕"/>
+        <a:font script="Hans" typeface="宋体"/>
+        <a:font script="Hant" typeface="新細明體"/>
+        <a:font script="Arab" typeface="Times New Roman"/>
+        <a:font script="Hebr" typeface="Times New Roman"/>
+        <a:font script="Thai" typeface="Angsana New"/>
+        <a:font script="Ethi" typeface="Nyala"/>
+        <a:font script="Beng" typeface="Vrinda"/>
+        <a:font script="Gujr" typeface="Shruti"/>
+        <a:font script="Khmr" typeface="MoolBoran"/>
+        <a:font script="Knda" typeface="Tunga"/>
+        <a:font script="Guru" typeface="Raavi"/>
+        <a:font script="Cans" typeface="Euphemia"/>
+        <a:font script="Cher" typeface="Plantagenet Cherokee"/>
+        <a:font script="Yiii" typeface="Microsoft Yi Baiti"/>
+        <a:font script="Tibt" typeface="Microsoft Himalaya"/>
+        <a:font script="Thaa" typeface="MV Boli"/>
+        <a:font script="Deva" typeface="Mangal"/>
+        <a:font script="Telu" typeface="Gautami"/>
+        <a:font script="Taml" typeface="Latha"/>
+        <a:font script="Syrc" typeface="Estrangelo Edessa"/>
+        <a:font script="Orya" typeface="Kalinga"/>
+        <a:font script="Mlym" typeface="Kartika"/>
+        <a:font script="Laoo" typeface="DokChampa"/>
+        <a:font script="Sinh" typeface="Iskoola Pota"/>
+        <a:font script="Mong" typeface="Mongolian Baiti"/>
+        <a:font script="Viet" typeface="Times New Roman"/>
+        <a:font script="Uigh" typeface="Microsoft Uighur"/>
+        <a:font script="Geor" typeface="Sylfaen"/>
+      </a:majorFont>
+      <a:minorFont>
+        <a:latin typeface="Calibri"/>
+        <a:ea typeface=""/>
+        <a:cs typeface=""/>
+        <a:font script="Jpan" typeface="ＭＳ Ｐゴシック"/>
+        <a:font script="Hang" typeface="맑은 고딕"/>
+        <a:font script="Hans" typeface="宋体"/>
+        <a:font script="Hant" typeface="新細明體"/>
+        <a:font script="Arab" typeface="Arial"/>
+        <a:font script="Hebr" typeface="Arial"/>
+        <a:font script="Thai" typeface="Cordia New"/>
+        <a:font script="Ethi" typeface="Nyala"/>
+        <a:font script="Beng" typeface="Vrinda"/>
+        <a:font script="Gujr" typeface="Shruti"/>
+        <a:font script="Khmr" typeface="DaunPenh"/>
+        <a:font script="Knda" typeface="Tunga"/>
+        <a:font script="Guru" typeface="Raavi"/>
+        <a:font script="Cans" typeface="Euphemia"/>
+        <a:font script="Cher" typeface="Plantagenet Cherokee"/>
+        <a:font script="Yiii" typeface="Microsoft Yi Baiti"/>
+        <a:font script="Tibt" typeface="Microsoft Himalaya"/>
+        <a:font script="Thaa" typeface="MV Boli"/>
+        <a:font script="Deva" typeface="Mangal"/>
+        <a:font script="Telu" typeface="Gautami"/>
+        <a:font script="Taml" typeface="Latha"/>
+        <a:font script="Syrc" typeface="Estrangelo Edessa"/>
+        <a:font script="Orya" typeface="Kalinga"/>
+        <a:font script="Mlym" typeface="Kartika"/>
+        <a:font script="Laoo" typeface="DokChampa"/>
+        <a:font script="Sinh" typeface="Iskoola Pota"/>
+        <a:font script="Mong" typeface="Mongolian Baiti"/>
+        <a:font script="Viet" typeface="Arial"/>
+        <a:font script="Uigh" typeface="Microsoft Uighur"/>
+        <a:font script="Geor" typeface="Sylfaen"/>
+      </a:minorFont>
+    </a:fontScheme>
+    <a:fmtScheme name="Office">
+      <a:fillStyleLst>
+        <a:solidFill>
+          <a:schemeClr val="phClr"/>
+        </a:solidFill>
+        <a:gradFill rotWithShape="1">
+          <a:gsLst>
+            <a:gs pos="0">
+              <a:schemeClr val="phClr">
+                <a:tint val="50000"/>
+                <a:satMod val="300000"/>
+              </a:schemeClr>
+            </a:gs>
+            <a:gs pos="35000">
+              <a:schemeClr val="phClr">
+                <a:tint val="37000"/>
+                <a:satMod val="300000"/>
+              </a:schemeClr>
+            </a:gs>
+            <a:gs pos="100000">
+              <a:schemeClr val="phClr">
+                <a:tint val="15000"/>
+                <a:satMod val="350000"/>
+              </a:schemeClr>
+            </a:gs>
+          </a:gsLst>
+          <a:lin ang="16200000" scaled="1"/>
+        </a:gradFill>
+        <a:gradFill rotWithShape="1">
+          <a:gsLst>
+            <a:gs pos="0">
+              <a:schemeClr val="phClr">
+                <a:shade val="51000"/>
+                <a:satMod val="130000"/>
+              </a:schemeClr>
+            </a:gs>
+            <a:gs pos="80000">
+              <a:schemeClr val="phClr">
+                <a:shade val="93000"/>
+                <a:satMod val="130000"/>
+              </a:schemeClr>
+            </a:gs>
+            <a:gs pos="100000">
+              <a:schemeClr val="phClr">
+                <a:shade val="94000"/>
+                <a:satMod val="135000"/>
+              </a:schemeClr>
+            </a:gs>
+          </a:gsLst>
+          <a:lin ang="16200000" scaled="0"/>
+        </a:gradFill>
+      </a:fillStyleLst>
+      <a:lnStyleLst>
+        <a:ln w="9525" cap="flat" cmpd="sng" algn="ctr">
+          <a:solidFill>
+            <a:schemeClr val="phClr">
+              <a:shade val="95000"/>
+              <a:satMod val="105000"/>
+            </a:schemeClr>
+          </a:solidFill>
+          <a:prstDash val="solid"/>
+        </a:ln>
+        <a:ln w="25400" cap="flat" cmpd="sng" algn="ctr">
+          <a:solidFill>
+            <a:schemeClr val="phClr"/>
+          </a:solidFill>
+          <a:prstDash val="solid"/>
+        </a:ln>
+        <a:ln w="38100" cap="flat" cmpd="sng" algn="ctr">
+          <a:solidFill>
+            <a:schemeClr val="phClr"/>
+          </a:solidFill>
+          <a:prstDash val="solid"/>
+        </a:ln>
+      </a:lnStyleLst>
+      <a:effectStyleLst>
+        <a:effectStyle>
+          <a:effectLst>
+            <a:outerShdw blurRad="40000" dist="20000" dir="5400000" rotWithShape="0">
+              <a:srgbClr val="000000">
+                <a:alpha val="38000"/>
+              </a:srgbClr>
+            </a:outerShdw>
+          </a:effectLst>
+        </a:effectStyle>
+        <a:effectStyle>
+          <a:effectLst>
+            <a:outerShdw blurRad="40000" dist="23000" dir="5400000" rotWithShape="0">
+              <a:srgbClr val="000000">
+                <a:alpha val="35000"/>
+              </a:srgbClr>
+            </a:outerShdw>
+          </a:effectLst>
+        </a:effectStyle>
+        <a:effectStyle>
+          <a:effectLst>
+            <a:outerShdw blurRad="40000" dist="23000" dir="5400000" rotWithShape="0">
+              <a:srgbClr val="000000">
+                <a:alpha val="35000"/>
+              </a:srgbClr>
+            </a:outerShdw>
+          </a:effectLst>
+          <a:scene3d>
+            <a:camera prst="orthographicFront">
+              <a:rot lat="0" lon="0" rev="0"/>
+            </a:camera>
+            <a:lightRig rig="threePt" dir="t">
+              <a:rot lat="0" lon="0" rev="1200000"/>
+            </a:lightRig>
+          </a:scene3d>
+          <a:sp3d>
+            <a:bevelT w="63500" h="25400"/>
+          </a:sp3d>
+        </a:effectStyle>
+      </a:effectStyleLst>
+      <a:bgFillStyleLst>
+        <a:solidFill>
+          <a:schemeClr val="phClr"/>
+        </a:solidFill>
+        <a:gradFill rotWithShape="1">
+          <a:gsLst>
+            <a:gs pos="0">
+              <a:schemeClr val="phClr">
+                <a:tint val="40000"/>
+                <a:satMod val="350000"/>
+              </a:schemeClr>
+            </a:gs>
+            <a:gs pos="40000">
+              <a:schemeClr val="phClr">
+                <a:tint val="45000"/>
+                <a:shade val="99000"/>
+                <a:satMod val="350000"/>
+              </a:schemeClr>
+            </a:gs>
+            <a:gs pos="100000">
+              <a:schemeClr val="phClr">
+                <a:shade val="20000"/>
+                <a:satMod val="255000"/>
+              </a:schemeClr>
+            </a:gs>
+          </a:gsLst>
+          <a:path path="circle">
+            <a:fillToRect l="50000" t="-80000" r="50000" b="180000"/>
+          </a:path>
+        </a:gradFill>
+        <a:gradFill rotWithShape="1">
+          <a:gsLst>
+            <a:gs pos="0">
+              <a:schemeClr val="phClr">
+                <a:tint val="80000"/>
+                <a:satMod val="300000"/>
+              </a:schemeClr>
+            </a:gs>
+            <a:gs pos="100000">
+              <a:schemeClr val="phClr">
+                <a:shade val="30000"/>
+                <a:satMod val="200000"/>
+              </a:schemeClr>
+            </a:gs>
+          </a:gsLst>
+          <a:path path="circle">
+            <a:fillToRect l="50000" t="50000" r="50000" b="50000"/>
+          </a:path>
+        </a:gradFill>
+      </a:bgFillStyleLst>
+    </a:fmtScheme>
+  </a:themeElements>
+  <a:objectDefaults/>
+  <a:extraClrSchemeLst/>
+</a:theme>
 </file>
</xml_diff>

<commit_message>
v1.1 - Task 1 with a bit more polish.
</commit_message>
<xml_diff>
--- a/Personal.pptx
+++ b/Personal.pptx
@@ -202,7 +202,7 @@
           <a:p>
             <a:fld id="{98684069-11BB-45F8-9966-9FCC1E0EFD90}" type="datetimeFigureOut">
               <a:rPr lang="en-IE" smtClean="0"/>
-              <a:t>10/10/2016</a:t>
+              <a:t>12/10/2016</a:t>
             </a:fld>
             <a:endParaRPr lang="en-IE"/>
           </a:p>
@@ -835,7 +835,7 @@
           <a:p>
             <a:fld id="{8B93F678-34A4-459B-AED2-FA781321FE01}" type="datetimeFigureOut">
               <a:rPr lang="en-IE" smtClean="0"/>
-              <a:t>10/10/2016</a:t>
+              <a:t>12/10/2016</a:t>
             </a:fld>
             <a:endParaRPr lang="en-IE"/>
           </a:p>
@@ -1000,7 +1000,7 @@
           <a:p>
             <a:fld id="{8B93F678-34A4-459B-AED2-FA781321FE01}" type="datetimeFigureOut">
               <a:rPr lang="en-IE" smtClean="0"/>
-              <a:t>10/10/2016</a:t>
+              <a:t>12/10/2016</a:t>
             </a:fld>
             <a:endParaRPr lang="en-IE"/>
           </a:p>
@@ -1175,7 +1175,7 @@
           <a:p>
             <a:fld id="{8B93F678-34A4-459B-AED2-FA781321FE01}" type="datetimeFigureOut">
               <a:rPr lang="en-IE" smtClean="0"/>
-              <a:t>10/10/2016</a:t>
+              <a:t>12/10/2016</a:t>
             </a:fld>
             <a:endParaRPr lang="en-IE"/>
           </a:p>
@@ -1340,7 +1340,7 @@
           <a:p>
             <a:fld id="{8B93F678-34A4-459B-AED2-FA781321FE01}" type="datetimeFigureOut">
               <a:rPr lang="en-IE" smtClean="0"/>
-              <a:t>10/10/2016</a:t>
+              <a:t>12/10/2016</a:t>
             </a:fld>
             <a:endParaRPr lang="en-IE"/>
           </a:p>
@@ -1582,7 +1582,7 @@
           <a:p>
             <a:fld id="{8B93F678-34A4-459B-AED2-FA781321FE01}" type="datetimeFigureOut">
               <a:rPr lang="en-IE" smtClean="0"/>
-              <a:t>10/10/2016</a:t>
+              <a:t>12/10/2016</a:t>
             </a:fld>
             <a:endParaRPr lang="en-IE"/>
           </a:p>
@@ -1846,7 +1846,7 @@
           <a:p>
             <a:fld id="{8B93F678-34A4-459B-AED2-FA781321FE01}" type="datetimeFigureOut">
               <a:rPr lang="en-IE" smtClean="0"/>
-              <a:t>10/10/2016</a:t>
+              <a:t>12/10/2016</a:t>
             </a:fld>
             <a:endParaRPr lang="en-IE"/>
           </a:p>
@@ -2224,7 +2224,7 @@
           <a:p>
             <a:fld id="{8B93F678-34A4-459B-AED2-FA781321FE01}" type="datetimeFigureOut">
               <a:rPr lang="en-IE" smtClean="0"/>
-              <a:t>10/10/2016</a:t>
+              <a:t>12/10/2016</a:t>
             </a:fld>
             <a:endParaRPr lang="en-IE"/>
           </a:p>
@@ -2374,7 +2374,7 @@
           <a:p>
             <a:fld id="{8B93F678-34A4-459B-AED2-FA781321FE01}" type="datetimeFigureOut">
               <a:rPr lang="en-IE" smtClean="0"/>
-              <a:t>10/10/2016</a:t>
+              <a:t>12/10/2016</a:t>
             </a:fld>
             <a:endParaRPr lang="en-IE"/>
           </a:p>
@@ -2464,7 +2464,7 @@
           <a:p>
             <a:fld id="{8B93F678-34A4-459B-AED2-FA781321FE01}" type="datetimeFigureOut">
               <a:rPr lang="en-IE" smtClean="0"/>
-              <a:t>10/10/2016</a:t>
+              <a:t>12/10/2016</a:t>
             </a:fld>
             <a:endParaRPr lang="en-IE"/>
           </a:p>
@@ -2725,7 +2725,7 @@
           <a:p>
             <a:fld id="{8B93F678-34A4-459B-AED2-FA781321FE01}" type="datetimeFigureOut">
               <a:rPr lang="en-IE" smtClean="0"/>
-              <a:t>10/10/2016</a:t>
+              <a:t>12/10/2016</a:t>
             </a:fld>
             <a:endParaRPr lang="en-IE"/>
           </a:p>
@@ -3013,7 +3013,7 @@
           <a:p>
             <a:fld id="{8B93F678-34A4-459B-AED2-FA781321FE01}" type="datetimeFigureOut">
               <a:rPr lang="en-IE" smtClean="0"/>
-              <a:t>10/10/2016</a:t>
+              <a:t>12/10/2016</a:t>
             </a:fld>
             <a:endParaRPr lang="en-IE"/>
           </a:p>
@@ -3784,7 +3784,7 @@
           <a:p>
             <a:fld id="{8B93F678-34A4-459B-AED2-FA781321FE01}" type="datetimeFigureOut">
               <a:rPr lang="en-IE" smtClean="0"/>
-              <a:t>10/10/2016</a:t>
+              <a:t>12/10/2016</a:t>
             </a:fld>
             <a:endParaRPr lang="en-IE"/>
           </a:p>
@@ -4402,6 +4402,47 @@
           <a:chExt cx="0" cy="0"/>
         </a:xfrm>
       </p:grpSpPr>
+      <p:pic>
+        <p:nvPicPr>
+          <p:cNvPr id="4" name="Picture 4" descr="Image result for self learning quotes"/>
+          <p:cNvPicPr>
+            <a:picLocks noChangeAspect="1" noChangeArrowheads="1"/>
+          </p:cNvPicPr>
+          <p:nvPr/>
+        </p:nvPicPr>
+        <p:blipFill>
+          <a:blip r:embed="rId2">
+            <a:extLst>
+              <a:ext uri="{28A0092B-C50C-407E-A947-70E740481C1C}">
+                <a14:useLocalDpi xmlns:a14="http://schemas.microsoft.com/office/drawing/2010/main" val="0"/>
+              </a:ext>
+            </a:extLst>
+          </a:blip>
+          <a:srcRect/>
+          <a:stretch>
+            <a:fillRect/>
+          </a:stretch>
+        </p:blipFill>
+        <p:spPr bwMode="auto">
+          <a:xfrm>
+            <a:off x="1259632" y="4308568"/>
+            <a:ext cx="6672606" cy="2549431"/>
+          </a:xfrm>
+          <a:prstGeom prst="rect">
+            <a:avLst/>
+          </a:prstGeom>
+          <a:noFill/>
+          <a:extLst>
+            <a:ext uri="{909E8E84-426E-40DD-AFC4-6F175D3DCCD1}">
+              <a14:hiddenFill xmlns:a14="http://schemas.microsoft.com/office/drawing/2010/main">
+                <a:solidFill>
+                  <a:srgbClr val="FFFFFF"/>
+                </a:solidFill>
+              </a14:hiddenFill>
+            </a:ext>
+          </a:extLst>
+        </p:spPr>
+      </p:pic>
       <p:sp>
         <p:nvSpPr>
           <p:cNvPr id="2" name="Title 1"/>
@@ -4414,40 +4455,38 @@
         </p:nvSpPr>
         <p:spPr>
           <a:xfrm>
-            <a:off x="539552" y="2204864"/>
+            <a:off x="561490" y="1052736"/>
             <a:ext cx="7851648" cy="1828800"/>
           </a:xfrm>
         </p:spPr>
         <p:txBody>
           <a:bodyPr numCol="1">
-            <a:normAutofit fontScale="90000"/>
+            <a:normAutofit/>
           </a:bodyPr>
           <a:lstStyle/>
           <a:p>
             <a:pPr algn="ctr"/>
             <a:r>
               <a:rPr lang="en-IE" dirty="0" smtClean="0"/>
-              <a:t>Personal </a:t>
+              <a:t>Personal</a:t>
+            </a:r>
+            <a:r>
+              <a:rPr lang="en-IE" dirty="0"/>
+              <a:t> </a:t>
+            </a:r>
+            <a:r>
+              <a:rPr lang="en-IE" dirty="0" smtClean="0"/>
+              <a:t>&amp; Professional </a:t>
+            </a:r>
+            <a:r>
+              <a:rPr lang="en-IE" dirty="0" smtClean="0"/>
+              <a:t/>
             </a:r>
             <a:br>
               <a:rPr lang="en-IE" dirty="0" smtClean="0"/>
             </a:br>
             <a:r>
               <a:rPr lang="en-IE" dirty="0" smtClean="0"/>
-              <a:t>&amp; </a:t>
-            </a:r>
-            <a:br>
-              <a:rPr lang="en-IE" dirty="0" smtClean="0"/>
-            </a:br>
-            <a:r>
-              <a:rPr lang="en-IE" dirty="0" smtClean="0"/>
-              <a:t>Professional </a:t>
-            </a:r>
-            <a:br>
-              <a:rPr lang="en-IE" dirty="0" smtClean="0"/>
-            </a:br>
-            <a:r>
-              <a:rPr lang="en-IE" dirty="0" smtClean="0"/>
               <a:t>Development</a:t>
             </a:r>
             <a:endParaRPr lang="en-IE" dirty="0"/>
@@ -4466,7 +4505,7 @@
         </p:nvSpPr>
         <p:spPr>
           <a:xfrm>
-            <a:off x="539552" y="4653136"/>
+            <a:off x="467544" y="2996952"/>
             <a:ext cx="7854696" cy="1752600"/>
           </a:xfrm>
         </p:spPr>
@@ -4547,7 +4586,7 @@
           <a:p>
             <a:r>
               <a:rPr lang="en-IE" dirty="0" smtClean="0"/>
-              <a:t>Bibliography</a:t>
+              <a:t>Useful Resources:</a:t>
             </a:r>
             <a:endParaRPr lang="en-IE" dirty="0"/>
           </a:p>
@@ -4638,12 +4677,22 @@
               <a:rPr lang="en-IE" dirty="0" smtClean="0"/>
             </a:br>
             <a:r>
-              <a:rPr lang="en-IE" dirty="0" smtClean="0"/>
+              <a:rPr lang="en-IE" dirty="0" smtClean="0">
+                <a:hlinkClick r:id="rId4"/>
+              </a:rPr>
               <a:t>http</a:t>
             </a:r>
             <a:r>
-              <a:rPr lang="en-IE" dirty="0"/>
-              <a:t>://www.wikihow.com/Teach</a:t>
+              <a:rPr lang="en-IE" dirty="0">
+                <a:hlinkClick r:id="rId4"/>
+              </a:rPr>
+              <a:t>://</a:t>
+            </a:r>
+            <a:r>
+              <a:rPr lang="en-IE" dirty="0" smtClean="0">
+                <a:hlinkClick r:id="rId4"/>
+              </a:rPr>
+              <a:t>www.wikihow.com/Teach</a:t>
             </a:r>
             <a:endParaRPr lang="en-IE" dirty="0" smtClean="0"/>
           </a:p>
@@ -4847,8 +4896,8 @@
         </p:blipFill>
         <p:spPr bwMode="auto">
           <a:xfrm>
-            <a:off x="0" y="1052736"/>
-            <a:ext cx="9144000" cy="5805264"/>
+            <a:off x="251520" y="1036915"/>
+            <a:ext cx="8640960" cy="5560437"/>
           </a:xfrm>
           <a:prstGeom prst="rect">
             <a:avLst/>
@@ -4907,10 +4956,6 @@
           </a:bodyPr>
           <a:lstStyle/>
           <a:p>
-            <a:pPr marL="514350" indent="-514350">
-              <a:buFont typeface="Arial" pitchFamily="34" charset="0"/>
-              <a:buChar char="•"/>
-            </a:pPr>
             <a:r>
               <a:rPr lang="en-IE" dirty="0" smtClean="0">
                 <a:solidFill>
@@ -4921,10 +4966,6 @@
             </a:r>
           </a:p>
           <a:p>
-            <a:pPr marL="514350" indent="-514350">
-              <a:buFont typeface="Arial" pitchFamily="34" charset="0"/>
-              <a:buChar char="•"/>
-            </a:pPr>
             <a:r>
               <a:rPr lang="en-IE" dirty="0">
                 <a:solidFill>
@@ -4943,10 +4984,6 @@
             </a:r>
           </a:p>
           <a:p>
-            <a:pPr marL="514350" indent="-514350">
-              <a:buFont typeface="Arial" pitchFamily="34" charset="0"/>
-              <a:buChar char="•"/>
-            </a:pPr>
             <a:r>
               <a:rPr lang="en-IE" dirty="0" smtClean="0">
                 <a:solidFill>
@@ -4973,10 +5010,6 @@
             </a:r>
           </a:p>
           <a:p>
-            <a:pPr marL="514350" indent="-514350">
-              <a:buFont typeface="Arial" pitchFamily="34" charset="0"/>
-              <a:buChar char="•"/>
-            </a:pPr>
             <a:r>
               <a:rPr lang="en-IE" dirty="0">
                 <a:solidFill>
@@ -4995,10 +5028,6 @@
             </a:r>
           </a:p>
           <a:p>
-            <a:pPr marL="514350" indent="-514350">
-              <a:buFont typeface="Arial" pitchFamily="34" charset="0"/>
-              <a:buChar char="•"/>
-            </a:pPr>
             <a:r>
               <a:rPr lang="en-IE" dirty="0">
                 <a:solidFill>
@@ -5017,10 +5046,6 @@
             </a:r>
           </a:p>
           <a:p>
-            <a:pPr marL="514350" indent="-514350">
-              <a:buFont typeface="Arial" pitchFamily="34" charset="0"/>
-              <a:buChar char="•"/>
-            </a:pPr>
             <a:r>
               <a:rPr lang="en-IE" dirty="0">
                 <a:solidFill>
@@ -5069,134 +5094,6 @@
           <a:chExt cx="0" cy="0"/>
         </a:xfrm>
       </p:grpSpPr>
-      <p:sp>
-        <p:nvSpPr>
-          <p:cNvPr id="2" name="Title 1"/>
-          <p:cNvSpPr>
-            <a:spLocks noGrp="1"/>
-          </p:cNvSpPr>
-          <p:nvPr>
-            <p:ph type="ctrTitle"/>
-          </p:nvPr>
-        </p:nvSpPr>
-        <p:spPr/>
-        <p:txBody>
-          <a:bodyPr>
-            <a:normAutofit fontScale="90000"/>
-          </a:bodyPr>
-          <a:lstStyle/>
-          <a:p>
-            <a:pPr algn="l"/>
-            <a:r>
-              <a:rPr lang="en-IE" dirty="0" smtClean="0"/>
-              <a:t>Benefits of </a:t>
-            </a:r>
-            <a:r>
-              <a:rPr lang="en-IE" dirty="0" smtClean="0"/>
-              <a:t/>
-            </a:r>
-            <a:br>
-              <a:rPr lang="en-IE" dirty="0" smtClean="0"/>
-            </a:br>
-            <a:r>
-              <a:rPr lang="en-IE" dirty="0" smtClean="0"/>
-              <a:t>Professional </a:t>
-            </a:r>
-            <a:br>
-              <a:rPr lang="en-IE" dirty="0" smtClean="0"/>
-            </a:br>
-            <a:r>
-              <a:rPr lang="en-IE" dirty="0" smtClean="0"/>
-              <a:t>Development</a:t>
-            </a:r>
-            <a:endParaRPr lang="en-IE" dirty="0"/>
-          </a:p>
-        </p:txBody>
-      </p:sp>
-      <p:sp>
-        <p:nvSpPr>
-          <p:cNvPr id="3" name="Subtitle 2"/>
-          <p:cNvSpPr>
-            <a:spLocks noGrp="1"/>
-          </p:cNvSpPr>
-          <p:nvPr>
-            <p:ph type="subTitle" idx="1"/>
-          </p:nvPr>
-        </p:nvSpPr>
-        <p:spPr/>
-        <p:txBody>
-          <a:bodyPr>
-            <a:normAutofit fontScale="85000" lnSpcReduction="20000"/>
-          </a:bodyPr>
-          <a:lstStyle/>
-          <a:p>
-            <a:pPr marL="457200" indent="-457200">
-              <a:buFont typeface="Arial" pitchFamily="34" charset="0"/>
-              <a:buChar char="•"/>
-            </a:pPr>
-            <a:r>
-              <a:rPr lang="en-IE" dirty="0"/>
-              <a:t>Sharpen your </a:t>
-            </a:r>
-            <a:r>
-              <a:rPr lang="en-IE" dirty="0" smtClean="0"/>
-              <a:t>knowledge</a:t>
-            </a:r>
-          </a:p>
-          <a:p>
-            <a:pPr marL="457200" indent="-457200">
-              <a:buFont typeface="Arial" pitchFamily="34" charset="0"/>
-              <a:buChar char="•"/>
-            </a:pPr>
-            <a:r>
-              <a:rPr lang="en-IE" dirty="0"/>
-              <a:t>Develop your </a:t>
-            </a:r>
-            <a:r>
-              <a:rPr lang="en-IE" dirty="0" smtClean="0"/>
-              <a:t>skills</a:t>
-            </a:r>
-          </a:p>
-          <a:p>
-            <a:pPr marL="457200" indent="-457200">
-              <a:buFont typeface="Arial" pitchFamily="34" charset="0"/>
-              <a:buChar char="•"/>
-            </a:pPr>
-            <a:r>
-              <a:rPr lang="en-IE" dirty="0"/>
-              <a:t>Keep </a:t>
-            </a:r>
-            <a:r>
-              <a:rPr lang="en-IE" dirty="0" smtClean="0"/>
-              <a:t>up-to-date</a:t>
-            </a:r>
-          </a:p>
-          <a:p>
-            <a:pPr marL="457200" indent="-457200">
-              <a:buFont typeface="Arial" pitchFamily="34" charset="0"/>
-              <a:buChar char="•"/>
-            </a:pPr>
-            <a:r>
-              <a:rPr lang="en-IE" dirty="0" smtClean="0"/>
-              <a:t>Start </a:t>
-            </a:r>
-            <a:r>
-              <a:rPr lang="en-IE" dirty="0"/>
-              <a:t>networking</a:t>
-            </a:r>
-          </a:p>
-          <a:p>
-            <a:pPr marL="457200" indent="-457200">
-              <a:buFont typeface="Arial" pitchFamily="34" charset="0"/>
-              <a:buChar char="•"/>
-            </a:pPr>
-            <a:r>
-              <a:rPr lang="en-IE" dirty="0"/>
-              <a:t>Reenergize your ideas</a:t>
-            </a:r>
-          </a:p>
-        </p:txBody>
-      </p:sp>
       <p:pic>
         <p:nvPicPr>
           <p:cNvPr id="6146" name="Picture 2" descr="Image result for professional development"/>
@@ -5220,7 +5117,7 @@
         </p:blipFill>
         <p:spPr bwMode="auto">
           <a:xfrm>
-            <a:off x="5611146" y="764704"/>
+            <a:off x="2555776" y="908720"/>
             <a:ext cx="3519061" cy="2340176"/>
           </a:xfrm>
           <a:prstGeom prst="rect">
@@ -5238,9 +5135,124 @@
           </a:extLst>
         </p:spPr>
       </p:pic>
+      <p:sp>
+        <p:nvSpPr>
+          <p:cNvPr id="2" name="Title 1"/>
+          <p:cNvSpPr>
+            <a:spLocks noGrp="1"/>
+          </p:cNvSpPr>
+          <p:nvPr>
+            <p:ph type="ctrTitle"/>
+          </p:nvPr>
+        </p:nvSpPr>
+        <p:spPr>
+          <a:xfrm>
+            <a:off x="2676871" y="548680"/>
+            <a:ext cx="3930588" cy="1026367"/>
+          </a:xfrm>
+        </p:spPr>
+        <p:txBody>
+          <a:bodyPr>
+            <a:normAutofit/>
+          </a:bodyPr>
+          <a:lstStyle/>
+          <a:p>
+            <a:pPr algn="l"/>
+            <a:r>
+              <a:rPr lang="en-IE" dirty="0" smtClean="0"/>
+              <a:t>Benefits of </a:t>
+            </a:r>
+            <a:endParaRPr lang="en-IE" dirty="0"/>
+          </a:p>
+        </p:txBody>
+      </p:sp>
+      <p:sp>
+        <p:nvSpPr>
+          <p:cNvPr id="3" name="Subtitle 2"/>
+          <p:cNvSpPr>
+            <a:spLocks noGrp="1"/>
+          </p:cNvSpPr>
+          <p:nvPr>
+            <p:ph type="subTitle" idx="1"/>
+          </p:nvPr>
+        </p:nvSpPr>
+        <p:spPr/>
+        <p:txBody>
+          <a:bodyPr>
+            <a:normAutofit fontScale="85000" lnSpcReduction="20000"/>
+          </a:bodyPr>
+          <a:lstStyle/>
+          <a:p>
+            <a:pPr marL="457200" indent="-457200">
+              <a:buFont typeface="Arial" pitchFamily="34" charset="0"/>
+              <a:buChar char="•"/>
+            </a:pPr>
+            <a:r>
+              <a:rPr lang="en-IE" dirty="0"/>
+              <a:t>Sharpen your </a:t>
+            </a:r>
+            <a:r>
+              <a:rPr lang="en-IE" dirty="0" smtClean="0"/>
+              <a:t>knowledge</a:t>
+            </a:r>
+          </a:p>
+          <a:p>
+            <a:pPr marL="457200" indent="-457200">
+              <a:buFont typeface="Arial" pitchFamily="34" charset="0"/>
+              <a:buChar char="•"/>
+            </a:pPr>
+            <a:r>
+              <a:rPr lang="en-IE" dirty="0"/>
+              <a:t>Develop your </a:t>
+            </a:r>
+            <a:r>
+              <a:rPr lang="en-IE" dirty="0" smtClean="0"/>
+              <a:t>skills</a:t>
+            </a:r>
+          </a:p>
+          <a:p>
+            <a:pPr marL="457200" indent="-457200">
+              <a:buFont typeface="Arial" pitchFamily="34" charset="0"/>
+              <a:buChar char="•"/>
+            </a:pPr>
+            <a:r>
+              <a:rPr lang="en-IE" dirty="0"/>
+              <a:t>Keep </a:t>
+            </a:r>
+            <a:r>
+              <a:rPr lang="en-IE" dirty="0" smtClean="0"/>
+              <a:t>up-to-date</a:t>
+            </a:r>
+          </a:p>
+          <a:p>
+            <a:pPr marL="457200" indent="-457200">
+              <a:buFont typeface="Arial" pitchFamily="34" charset="0"/>
+              <a:buChar char="•"/>
+            </a:pPr>
+            <a:r>
+              <a:rPr lang="en-IE" dirty="0" smtClean="0"/>
+              <a:t>Start </a:t>
+            </a:r>
+            <a:r>
+              <a:rPr lang="en-IE" dirty="0"/>
+              <a:t>networking</a:t>
+            </a:r>
+          </a:p>
+          <a:p>
+            <a:pPr marL="457200" indent="-457200">
+              <a:buFont typeface="Arial" pitchFamily="34" charset="0"/>
+              <a:buChar char="•"/>
+            </a:pPr>
+            <a:r>
+              <a:rPr lang="en-IE" dirty="0"/>
+              <a:t>Reenergize your ideas</a:t>
+            </a:r>
+          </a:p>
+        </p:txBody>
+      </p:sp>
       <p:pic>
         <p:nvPicPr>
-          <p:cNvPr id="6148" name="Picture 4" descr="Image result for self learning quotes"/>
+          <p:cNvPr id="2050" name="Picture 2" descr="Image result for benefits of professional development"/>
           <p:cNvPicPr>
             <a:picLocks noChangeAspect="1" noChangeArrowheads="1"/>
           </p:cNvPicPr>
@@ -5261,8 +5273,8 @@
         </p:blipFill>
         <p:spPr bwMode="auto">
           <a:xfrm>
-            <a:off x="899592" y="4941168"/>
-            <a:ext cx="7128792" cy="2003648"/>
+            <a:off x="251520" y="4944008"/>
+            <a:ext cx="8676456" cy="1916832"/>
           </a:xfrm>
           <a:prstGeom prst="rect">
             <a:avLst/>
@@ -5316,16 +5328,233 @@
           <a:chExt cx="0" cy="0"/>
         </a:xfrm>
       </p:grpSpPr>
+      <p:sp>
+        <p:nvSpPr>
+          <p:cNvPr id="2" name="Title 1"/>
+          <p:cNvSpPr>
+            <a:spLocks noGrp="1"/>
+          </p:cNvSpPr>
+          <p:nvPr>
+            <p:ph type="ctrTitle"/>
+          </p:nvPr>
+        </p:nvSpPr>
+        <p:spPr/>
+        <p:txBody>
+          <a:bodyPr>
+            <a:normAutofit fontScale="90000"/>
+          </a:bodyPr>
+          <a:lstStyle/>
+          <a:p>
+            <a:r>
+              <a:rPr lang="en-IE" b="0" dirty="0">
+                <a:effectLst/>
+              </a:rPr>
+              <a:t>D</a:t>
+            </a:r>
+            <a:r>
+              <a:rPr lang="en-IE" b="0" dirty="0" smtClean="0">
+                <a:effectLst/>
+              </a:rPr>
+              <a:t>evelopment</a:t>
+            </a:r>
+            <a:r>
+              <a:rPr lang="en-IE" b="0" dirty="0">
+                <a:effectLst/>
+              </a:rPr>
+              <a:t> </a:t>
+            </a:r>
+            <a:r>
+              <a:rPr lang="en-IE" b="0" dirty="0" smtClean="0">
+                <a:effectLst/>
+              </a:rPr>
+              <a:t/>
+            </a:r>
+            <a:br>
+              <a:rPr lang="en-IE" b="0" dirty="0" smtClean="0">
+                <a:effectLst/>
+              </a:rPr>
+            </a:br>
+            <a:r>
+              <a:rPr lang="en-IE" b="0" dirty="0" smtClean="0">
+                <a:effectLst/>
+              </a:rPr>
+              <a:t>Opportunities for </a:t>
+            </a:r>
+            <a:r>
+              <a:rPr lang="en-IE" b="0" dirty="0" smtClean="0">
+                <a:effectLst/>
+              </a:rPr>
+              <a:t>Personal Development</a:t>
+            </a:r>
+            <a:endParaRPr lang="en-IE" dirty="0"/>
+          </a:p>
+        </p:txBody>
+      </p:sp>
+      <p:sp>
+        <p:nvSpPr>
+          <p:cNvPr id="3" name="Subtitle 2"/>
+          <p:cNvSpPr>
+            <a:spLocks noGrp="1"/>
+          </p:cNvSpPr>
+          <p:nvPr>
+            <p:ph type="subTitle" idx="1"/>
+          </p:nvPr>
+        </p:nvSpPr>
+        <p:spPr>
+          <a:xfrm>
+            <a:off x="539552" y="3501008"/>
+            <a:ext cx="7854696" cy="992552"/>
+          </a:xfrm>
+        </p:spPr>
+        <p:txBody>
+          <a:bodyPr numCol="2" anchor="ctr">
+            <a:noAutofit/>
+          </a:bodyPr>
+          <a:lstStyle/>
+          <a:p>
+            <a:pPr marL="514350" indent="-514350" algn="ctr">
+              <a:buFont typeface="+mj-lt"/>
+              <a:buAutoNum type="arabicPeriod"/>
+            </a:pPr>
+            <a:r>
+              <a:rPr lang="en-IE" sz="2000" dirty="0" smtClean="0">
+                <a:solidFill>
+                  <a:schemeClr val="bg1"/>
+                </a:solidFill>
+              </a:rPr>
+              <a:t>Being </a:t>
+            </a:r>
+            <a:r>
+              <a:rPr lang="en-IE" sz="2000" dirty="0">
+                <a:solidFill>
+                  <a:schemeClr val="bg1"/>
+                </a:solidFill>
+              </a:rPr>
+              <a:t>coached or </a:t>
+            </a:r>
+            <a:r>
+              <a:rPr lang="en-IE" sz="2000" dirty="0" smtClean="0">
+                <a:solidFill>
+                  <a:schemeClr val="bg1"/>
+                </a:solidFill>
+              </a:rPr>
+              <a:t>mentored</a:t>
+            </a:r>
+          </a:p>
+          <a:p>
+            <a:pPr marL="514350" indent="-514350" algn="ctr">
+              <a:buFont typeface="+mj-lt"/>
+              <a:buAutoNum type="arabicPeriod"/>
+            </a:pPr>
+            <a:r>
+              <a:rPr lang="en-IE" sz="2000" dirty="0" smtClean="0">
+                <a:solidFill>
+                  <a:schemeClr val="bg1"/>
+                </a:solidFill>
+              </a:rPr>
+              <a:t>Advice </a:t>
+            </a:r>
+            <a:r>
+              <a:rPr lang="en-IE" sz="2000" dirty="0">
+                <a:solidFill>
+                  <a:schemeClr val="bg1"/>
+                </a:solidFill>
+              </a:rPr>
+              <a:t>from </a:t>
+            </a:r>
+            <a:r>
+              <a:rPr lang="en-IE" sz="2000" dirty="0" smtClean="0">
+                <a:solidFill>
+                  <a:schemeClr val="bg1"/>
+                </a:solidFill>
+              </a:rPr>
+              <a:t>colleagues</a:t>
+            </a:r>
+          </a:p>
+          <a:p>
+            <a:pPr marL="514350" indent="-514350" algn="ctr">
+              <a:buFont typeface="+mj-lt"/>
+              <a:buAutoNum type="arabicPeriod"/>
+            </a:pPr>
+            <a:r>
+              <a:rPr lang="en-IE" sz="2000" dirty="0" smtClean="0">
+                <a:solidFill>
+                  <a:schemeClr val="bg1"/>
+                </a:solidFill>
+              </a:rPr>
+              <a:t>E-learning</a:t>
+            </a:r>
+            <a:endParaRPr lang="en-IE" sz="2000" dirty="0" smtClean="0">
+              <a:solidFill>
+                <a:schemeClr val="bg1"/>
+              </a:solidFill>
+            </a:endParaRPr>
+          </a:p>
+          <a:p>
+            <a:pPr marL="514350" indent="-514350" algn="ctr">
+              <a:buFont typeface="+mj-lt"/>
+              <a:buAutoNum type="arabicPeriod"/>
+            </a:pPr>
+            <a:r>
+              <a:rPr lang="en-IE" sz="2000" dirty="0" smtClean="0">
+                <a:solidFill>
+                  <a:schemeClr val="bg1"/>
+                </a:solidFill>
+              </a:rPr>
+              <a:t>Volunteering</a:t>
+            </a:r>
+          </a:p>
+        </p:txBody>
+      </p:sp>
+      <p:sp>
+        <p:nvSpPr>
+          <p:cNvPr id="7" name="AutoShape 6" descr="Image result for mentor"/>
+          <p:cNvSpPr>
+            <a:spLocks noChangeAspect="1" noChangeArrowheads="1"/>
+          </p:cNvSpPr>
+          <p:nvPr/>
+        </p:nvSpPr>
+        <p:spPr bwMode="auto">
+          <a:xfrm>
+            <a:off x="155575" y="-144463"/>
+            <a:ext cx="304800" cy="304801"/>
+          </a:xfrm>
+          <a:prstGeom prst="rect">
+            <a:avLst/>
+          </a:prstGeom>
+          <a:noFill/>
+          <a:extLst>
+            <a:ext uri="{909E8E84-426E-40DD-AFC4-6F175D3DCCD1}">
+              <a14:hiddenFill xmlns:a14="http://schemas.microsoft.com/office/drawing/2010/main">
+                <a:solidFill>
+                  <a:srgbClr val="FFFFFF"/>
+                </a:solidFill>
+              </a14:hiddenFill>
+            </a:ext>
+          </a:extLst>
+        </p:spPr>
+        <p:txBody>
+          <a:bodyPr vert="horz" wrap="square" lIns="91440" tIns="45720" rIns="91440" bIns="45720" numCol="1" anchor="t" anchorCtr="0" compatLnSpc="1">
+            <a:prstTxWarp prst="textNoShape">
+              <a:avLst/>
+            </a:prstTxWarp>
+          </a:bodyPr>
+          <a:lstStyle/>
+          <a:p>
+            <a:endParaRPr lang="en-US"/>
+          </a:p>
+        </p:txBody>
+      </p:sp>
       <p:pic>
         <p:nvPicPr>
-          <p:cNvPr id="4" name="Picture 2" descr="Image result for opportunities"/>
+          <p:cNvPr id="1032" name="Picture 8" descr="Image result for mentor"/>
           <p:cNvPicPr>
             <a:picLocks noChangeAspect="1" noChangeArrowheads="1"/>
           </p:cNvPicPr>
           <p:nvPr/>
         </p:nvPicPr>
         <p:blipFill>
-          <a:blip r:embed="rId2">
+          <a:blip r:embed="rId2" cstate="print">
             <a:extLst>
               <a:ext uri="{28A0092B-C50C-407E-A947-70E740481C1C}">
                 <a14:useLocalDpi xmlns:a14="http://schemas.microsoft.com/office/drawing/2010/main" val="0"/>
@@ -5339,8 +5568,8 @@
         </p:blipFill>
         <p:spPr bwMode="auto">
           <a:xfrm>
-            <a:off x="539552" y="1235900"/>
-            <a:ext cx="7438653" cy="4950341"/>
+            <a:off x="5828084" y="4647389"/>
+            <a:ext cx="3315916" cy="2210611"/>
           </a:xfrm>
           <a:prstGeom prst="rect">
             <a:avLst/>
@@ -5357,154 +5586,129 @@
           </a:extLst>
         </p:spPr>
       </p:pic>
-      <p:sp>
-        <p:nvSpPr>
-          <p:cNvPr id="2" name="Title 1"/>
-          <p:cNvSpPr>
-            <a:spLocks noGrp="1"/>
-          </p:cNvSpPr>
-          <p:nvPr>
-            <p:ph type="ctrTitle"/>
-          </p:nvPr>
-        </p:nvSpPr>
-        <p:spPr/>
-        <p:txBody>
-          <a:bodyPr>
-            <a:normAutofit fontScale="90000"/>
-          </a:bodyPr>
-          <a:lstStyle/>
-          <a:p>
-            <a:r>
-              <a:rPr lang="en-IE" b="0" dirty="0">
-                <a:effectLst/>
-              </a:rPr>
-              <a:t>D</a:t>
-            </a:r>
-            <a:r>
-              <a:rPr lang="en-IE" b="0" dirty="0" smtClean="0">
-                <a:effectLst/>
-              </a:rPr>
-              <a:t>evelopment</a:t>
-            </a:r>
-            <a:r>
-              <a:rPr lang="en-IE" b="0" dirty="0">
-                <a:effectLst/>
-              </a:rPr>
-              <a:t> </a:t>
-            </a:r>
-            <a:r>
-              <a:rPr lang="en-IE" b="0" dirty="0" smtClean="0">
-                <a:effectLst/>
-              </a:rPr>
-              <a:t/>
-            </a:r>
-            <a:br>
-              <a:rPr lang="en-IE" b="0" dirty="0" smtClean="0">
-                <a:effectLst/>
-              </a:rPr>
-            </a:br>
-            <a:r>
-              <a:rPr lang="en-IE" b="0" dirty="0" smtClean="0">
-                <a:effectLst/>
-              </a:rPr>
-              <a:t>Opportunities </a:t>
-            </a:r>
-            <a:r>
-              <a:rPr lang="en-IE" b="0" dirty="0">
-                <a:effectLst/>
-              </a:rPr>
-              <a:t>for </a:t>
-            </a:r>
-            <a:r>
-              <a:rPr lang="en-IE" b="0" dirty="0" smtClean="0">
-                <a:effectLst/>
-              </a:rPr>
-              <a:t>Personal Development</a:t>
-            </a:r>
-            <a:endParaRPr lang="en-IE" dirty="0"/>
-          </a:p>
-        </p:txBody>
-      </p:sp>
-      <p:sp>
-        <p:nvSpPr>
-          <p:cNvPr id="3" name="Subtitle 2"/>
-          <p:cNvSpPr>
-            <a:spLocks noGrp="1"/>
-          </p:cNvSpPr>
-          <p:nvPr>
-            <p:ph type="subTitle" idx="1"/>
-          </p:nvPr>
-        </p:nvSpPr>
-        <p:spPr>
+      <p:pic>
+        <p:nvPicPr>
+          <p:cNvPr id="1034" name="Picture 10" descr="Image result for e-learning"/>
+          <p:cNvPicPr>
+            <a:picLocks noChangeAspect="1" noChangeArrowheads="1"/>
+          </p:cNvPicPr>
+          <p:nvPr/>
+        </p:nvPicPr>
+        <p:blipFill>
+          <a:blip r:embed="rId3" cstate="print">
+            <a:extLst>
+              <a:ext uri="{28A0092B-C50C-407E-A947-70E740481C1C}">
+                <a14:useLocalDpi xmlns:a14="http://schemas.microsoft.com/office/drawing/2010/main" val="0"/>
+              </a:ext>
+            </a:extLst>
+          </a:blip>
+          <a:srcRect/>
+          <a:stretch>
+            <a:fillRect/>
+          </a:stretch>
+        </p:blipFill>
+        <p:spPr bwMode="auto">
           <a:xfrm>
-            <a:off x="539552" y="3501008"/>
-            <a:ext cx="7854696" cy="992552"/>
+            <a:off x="1177529" y="692696"/>
+            <a:ext cx="3168352" cy="1056118"/>
           </a:xfrm>
+          <a:prstGeom prst="rect">
+            <a:avLst/>
+          </a:prstGeom>
+          <a:noFill/>
+          <a:extLst>
+            <a:ext uri="{909E8E84-426E-40DD-AFC4-6F175D3DCCD1}">
+              <a14:hiddenFill xmlns:a14="http://schemas.microsoft.com/office/drawing/2010/main">
+                <a:solidFill>
+                  <a:srgbClr val="FFFFFF"/>
+                </a:solidFill>
+              </a14:hiddenFill>
+            </a:ext>
+          </a:extLst>
         </p:spPr>
-        <p:txBody>
-          <a:bodyPr numCol="2" anchor="ctr">
-            <a:noAutofit/>
-          </a:bodyPr>
-          <a:lstStyle/>
-          <a:p>
-            <a:pPr marL="514350" indent="-514350" algn="ctr">
-              <a:buFont typeface="+mj-lt"/>
-              <a:buAutoNum type="arabicPeriod"/>
-            </a:pPr>
-            <a:r>
-              <a:rPr lang="en-IE" sz="2000" dirty="0" smtClean="0"/>
-              <a:t>Being </a:t>
-            </a:r>
-            <a:r>
-              <a:rPr lang="en-IE" sz="2000" dirty="0"/>
-              <a:t>coached or </a:t>
-            </a:r>
-            <a:r>
-              <a:rPr lang="en-IE" sz="2000" dirty="0" smtClean="0"/>
-              <a:t>mentored</a:t>
-            </a:r>
-          </a:p>
-          <a:p>
-            <a:pPr marL="514350" indent="-514350" algn="ctr">
-              <a:buFont typeface="+mj-lt"/>
-              <a:buAutoNum type="arabicPeriod"/>
-            </a:pPr>
-            <a:r>
-              <a:rPr lang="en-IE" sz="2000" dirty="0" smtClean="0"/>
-              <a:t>Advice </a:t>
-            </a:r>
-            <a:r>
-              <a:rPr lang="en-IE" sz="2000" dirty="0"/>
-              <a:t>from </a:t>
-            </a:r>
-            <a:r>
-              <a:rPr lang="en-IE" sz="2000" dirty="0" smtClean="0"/>
-              <a:t>colleagues</a:t>
-            </a:r>
-          </a:p>
-          <a:p>
-            <a:pPr marL="514350" indent="-514350" algn="ctr">
-              <a:buFont typeface="+mj-lt"/>
-              <a:buAutoNum type="arabicPeriod"/>
-            </a:pPr>
-            <a:r>
-              <a:rPr lang="en-IE" sz="2000" dirty="0" smtClean="0"/>
-              <a:t>e-learning</a:t>
-            </a:r>
-          </a:p>
-          <a:p>
-            <a:pPr marL="514350" indent="-514350" algn="ctr">
-              <a:buFont typeface="+mj-lt"/>
-              <a:buAutoNum type="arabicPeriod"/>
-            </a:pPr>
-            <a:r>
-              <a:rPr lang="en-IE" sz="2000" dirty="0" smtClean="0"/>
-              <a:t>Volunteering</a:t>
-            </a:r>
-            <a:endParaRPr lang="en-IE" sz="2000" dirty="0" smtClean="0"/>
-          </a:p>
-        </p:txBody>
-      </p:sp>
+      </p:pic>
+      <p:pic>
+        <p:nvPicPr>
+          <p:cNvPr id="1036" name="Picture 12" descr="Image result for volunteer work"/>
+          <p:cNvPicPr>
+            <a:picLocks noChangeAspect="1" noChangeArrowheads="1"/>
+          </p:cNvPicPr>
+          <p:nvPr/>
+        </p:nvPicPr>
+        <p:blipFill>
+          <a:blip r:embed="rId4" cstate="print">
+            <a:extLst>
+              <a:ext uri="{28A0092B-C50C-407E-A947-70E740481C1C}">
+                <a14:useLocalDpi xmlns:a14="http://schemas.microsoft.com/office/drawing/2010/main" val="0"/>
+              </a:ext>
+            </a:extLst>
+          </a:blip>
+          <a:srcRect/>
+          <a:stretch>
+            <a:fillRect/>
+          </a:stretch>
+        </p:blipFill>
+        <p:spPr bwMode="auto">
+          <a:xfrm>
+            <a:off x="0" y="2331982"/>
+            <a:ext cx="2047411" cy="1373004"/>
+          </a:xfrm>
+          <a:prstGeom prst="rect">
+            <a:avLst/>
+          </a:prstGeom>
+          <a:noFill/>
+          <a:extLst>
+            <a:ext uri="{909E8E84-426E-40DD-AFC4-6F175D3DCCD1}">
+              <a14:hiddenFill xmlns:a14="http://schemas.microsoft.com/office/drawing/2010/main">
+                <a:solidFill>
+                  <a:srgbClr val="FFFFFF"/>
+                </a:solidFill>
+              </a14:hiddenFill>
+            </a:ext>
+          </a:extLst>
+        </p:spPr>
+      </p:pic>
+      <p:pic>
+        <p:nvPicPr>
+          <p:cNvPr id="1038" name="Picture 14" descr="Image result for colleagues"/>
+          <p:cNvPicPr>
+            <a:picLocks noChangeAspect="1" noChangeArrowheads="1"/>
+          </p:cNvPicPr>
+          <p:nvPr/>
+        </p:nvPicPr>
+        <p:blipFill>
+          <a:blip r:embed="rId5" cstate="print">
+            <a:extLst>
+              <a:ext uri="{28A0092B-C50C-407E-A947-70E740481C1C}">
+                <a14:useLocalDpi xmlns:a14="http://schemas.microsoft.com/office/drawing/2010/main" val="0"/>
+              </a:ext>
+            </a:extLst>
+          </a:blip>
+          <a:srcRect/>
+          <a:stretch>
+            <a:fillRect/>
+          </a:stretch>
+        </p:blipFill>
+        <p:spPr bwMode="auto">
+          <a:xfrm>
+            <a:off x="0" y="4639460"/>
+            <a:ext cx="3995936" cy="2252820"/>
+          </a:xfrm>
+          <a:prstGeom prst="rect">
+            <a:avLst/>
+          </a:prstGeom>
+          <a:noFill/>
+          <a:extLst>
+            <a:ext uri="{909E8E84-426E-40DD-AFC4-6F175D3DCCD1}">
+              <a14:hiddenFill xmlns:a14="http://schemas.microsoft.com/office/drawing/2010/main">
+                <a:solidFill>
+                  <a:srgbClr val="FFFFFF"/>
+                </a:solidFill>
+              </a14:hiddenFill>
+            </a:ext>
+          </a:extLst>
+        </p:spPr>
+      </p:pic>
     </p:spTree>
     <p:extLst>
       <p:ext uri="{BB962C8B-B14F-4D97-AF65-F5344CB8AC3E}">
@@ -5602,13 +5806,7 @@
               <a:rPr lang="en-IE" b="0" dirty="0" smtClean="0">
                 <a:effectLst/>
               </a:rPr>
-              <a:t>Why these </a:t>
-            </a:r>
-            <a:r>
-              <a:rPr lang="en-IE" b="0" dirty="0" smtClean="0">
-                <a:effectLst/>
-              </a:rPr>
-              <a:t>opportunities</a:t>
+              <a:t>Why these opportunities</a:t>
             </a:r>
             <a:endParaRPr lang="en-IE" dirty="0"/>
           </a:p>
@@ -5677,7 +5875,6 @@
               <a:rPr lang="en-IE" sz="2000" dirty="0"/>
               <a:t>Learn while helping others</a:t>
             </a:r>
-            <a:endParaRPr lang="en-IE" sz="2000" dirty="0"/>
           </a:p>
           <a:p>
             <a:pPr marL="514350" indent="-514350" algn="ctr">
@@ -5741,8 +5938,8 @@
         </p:blipFill>
         <p:spPr bwMode="auto">
           <a:xfrm>
-            <a:off x="155575" y="1736910"/>
-            <a:ext cx="6792689" cy="5094517"/>
+            <a:off x="155575" y="1052736"/>
+            <a:ext cx="8808913" cy="5778691"/>
           </a:xfrm>
           <a:prstGeom prst="rect">
             <a:avLst/>
@@ -5769,7 +5966,12 @@
             <p:ph type="ctrTitle"/>
           </p:nvPr>
         </p:nvSpPr>
-        <p:spPr/>
+        <p:spPr>
+          <a:xfrm>
+            <a:off x="2339752" y="692696"/>
+            <a:ext cx="4389112" cy="1139552"/>
+          </a:xfrm>
+        </p:spPr>
         <p:txBody>
           <a:bodyPr/>
           <a:lstStyle/>
@@ -5794,66 +5996,79 @@
             <p:ph type="subTitle" idx="1"/>
           </p:nvPr>
         </p:nvSpPr>
-        <p:spPr/>
+        <p:spPr>
+          <a:xfrm>
+            <a:off x="323528" y="2420888"/>
+            <a:ext cx="7854696" cy="1752600"/>
+          </a:xfrm>
+        </p:spPr>
         <p:txBody>
           <a:bodyPr>
             <a:normAutofit fontScale="85000" lnSpcReduction="20000"/>
           </a:bodyPr>
           <a:lstStyle/>
           <a:p>
-            <a:pPr marL="514350" indent="-514350">
-              <a:buFont typeface="+mj-lt"/>
-              <a:buAutoNum type="arabicPeriod"/>
-            </a:pPr>
-            <a:r>
-              <a:rPr lang="en-IE" dirty="0"/>
+            <a:r>
+              <a:rPr lang="en-IE" dirty="0">
+                <a:solidFill>
+                  <a:schemeClr val="bg1"/>
+                </a:solidFill>
+              </a:rPr>
               <a:t>Establish </a:t>
             </a:r>
             <a:r>
-              <a:rPr lang="en-IE" dirty="0" smtClean="0"/>
+              <a:rPr lang="en-IE" dirty="0" smtClean="0">
+                <a:solidFill>
+                  <a:schemeClr val="bg1"/>
+                </a:solidFill>
+              </a:rPr>
               <a:t>successes and failures</a:t>
             </a:r>
           </a:p>
           <a:p>
-            <a:pPr marL="514350" indent="-514350">
-              <a:buFont typeface="+mj-lt"/>
-              <a:buAutoNum type="arabicPeriod"/>
-            </a:pPr>
-            <a:r>
-              <a:rPr lang="en-IE" dirty="0" smtClean="0"/>
+            <a:r>
+              <a:rPr lang="en-IE" dirty="0" smtClean="0">
+                <a:solidFill>
+                  <a:schemeClr val="bg1"/>
+                </a:solidFill>
+              </a:rPr>
               <a:t>Understand the reasons</a:t>
             </a:r>
           </a:p>
           <a:p>
-            <a:pPr marL="514350" indent="-514350">
-              <a:buFont typeface="+mj-lt"/>
-              <a:buAutoNum type="arabicPeriod"/>
-            </a:pPr>
-            <a:r>
-              <a:rPr lang="en-IE" dirty="0" smtClean="0"/>
+            <a:r>
+              <a:rPr lang="en-IE" dirty="0" smtClean="0">
+                <a:solidFill>
+                  <a:schemeClr val="bg1"/>
+                </a:solidFill>
+              </a:rPr>
               <a:t>Opportunities for improvement next time</a:t>
             </a:r>
           </a:p>
           <a:p>
-            <a:pPr marL="514350" indent="-514350">
-              <a:buFont typeface="+mj-lt"/>
-              <a:buAutoNum type="arabicPeriod"/>
-            </a:pPr>
-            <a:r>
-              <a:rPr lang="en-IE" dirty="0" smtClean="0"/>
+            <a:r>
+              <a:rPr lang="en-IE" dirty="0" smtClean="0">
+                <a:solidFill>
+                  <a:schemeClr val="bg1"/>
+                </a:solidFill>
+              </a:rPr>
               <a:t>Identify lessons</a:t>
             </a:r>
           </a:p>
           <a:p>
-            <a:pPr marL="514350" indent="-514350">
-              <a:buFont typeface="+mj-lt"/>
-              <a:buAutoNum type="arabicPeriod"/>
-            </a:pPr>
-            <a:r>
-              <a:rPr lang="en-IE" dirty="0" smtClean="0"/>
+            <a:r>
+              <a:rPr lang="en-IE" dirty="0" smtClean="0">
+                <a:solidFill>
+                  <a:schemeClr val="bg1"/>
+                </a:solidFill>
+              </a:rPr>
               <a:t>Determine needed changes</a:t>
             </a:r>
-            <a:endParaRPr lang="en-IE" dirty="0"/>
+            <a:endParaRPr lang="en-IE" dirty="0">
+              <a:solidFill>
+                <a:schemeClr val="bg1"/>
+              </a:solidFill>
+            </a:endParaRPr>
           </a:p>
         </p:txBody>
       </p:sp>
@@ -5908,10 +6123,6 @@
             <a:r>
               <a:rPr lang="en-IE" dirty="0" smtClean="0"/>
               <a:t>Benefits </a:t>
-            </a:r>
-            <a:r>
-              <a:rPr lang="en-IE" dirty="0" smtClean="0"/>
-              <a:t/>
             </a:r>
             <a:br>
               <a:rPr lang="en-IE" dirty="0" smtClean="0"/>
@@ -6168,13 +6379,7 @@
               <a:rPr lang="en-IE" b="0" dirty="0" smtClean="0">
                 <a:effectLst/>
               </a:rPr>
-              <a:t>People </a:t>
-            </a:r>
-            <a:r>
-              <a:rPr lang="en-IE" b="0" dirty="0" smtClean="0">
-                <a:effectLst/>
-              </a:rPr>
-              <a:t>Learn</a:t>
+              <a:t>People Learn</a:t>
             </a:r>
             <a:endParaRPr lang="en-IE" dirty="0"/>
           </a:p>
@@ -6228,11 +6433,7 @@
             </a:pPr>
             <a:r>
               <a:rPr lang="en-IE" dirty="0" smtClean="0"/>
-              <a:t>Logical thinking develops </a:t>
-            </a:r>
-            <a:r>
-              <a:rPr lang="en-IE" dirty="0" smtClean="0"/>
-              <a:t>primarily through feedback</a:t>
+              <a:t>Logical thinking develops primarily through feedback</a:t>
             </a:r>
           </a:p>
           <a:p>

</xml_diff>